<commit_message>
Version 3.4; Updated LamPI-node and Rules editor files
</commit_message>
<xml_diff>
--- a/gh-pages/DeveloperGuide/ArchitectureGuide/architecture.pptx
+++ b/gh-pages/DeveloperGuide/ArchitectureGuide/architecture.pptx
@@ -4,9 +4,13 @@
   <p:sldMasterIdLst>
     <p:sldMasterId id="2147483648" r:id="rId1"/>
   </p:sldMasterIdLst>
+  <p:notesMasterIdLst>
+    <p:notesMasterId r:id="rId5"/>
+  </p:notesMasterIdLst>
   <p:sldIdLst>
     <p:sldId id="256" r:id="rId2"/>
     <p:sldId id="257" r:id="rId3"/>
+    <p:sldId id="258" r:id="rId4"/>
   </p:sldIdLst>
   <p:sldSz cx="9144000" cy="6858000" type="screen4x3"/>
   <p:notesSz cx="6858000" cy="9144000"/>
@@ -105,7 +109,457 @@
       </a:defRPr>
     </a:lvl9pPr>
   </p:defaultTextStyle>
+  <p:extLst>
+    <p:ext uri="{EFAFB233-063F-42B5-8137-9DF3F51BA10A}">
+      <p15:sldGuideLst xmlns:p15="http://schemas.microsoft.com/office/powerpoint/2012/main">
+        <p15:guide id="1" orient="horz" pos="2160">
+          <p15:clr>
+            <a:srgbClr val="A4A3A4"/>
+          </p15:clr>
+        </p15:guide>
+        <p15:guide id="2" pos="2880">
+          <p15:clr>
+            <a:srgbClr val="A4A3A4"/>
+          </p15:clr>
+        </p15:guide>
+      </p15:sldGuideLst>
+    </p:ext>
+  </p:extLst>
 </p:presentation>
+</file>
+
+<file path=ppt/notesMasters/notesMaster1.xml><?xml version="1.0" encoding="utf-8"?>
+<p:notesMaster xmlns:a="http://schemas.openxmlformats.org/drawingml/2006/main" xmlns:r="http://schemas.openxmlformats.org/officeDocument/2006/relationships" xmlns:p="http://schemas.openxmlformats.org/presentationml/2006/main">
+  <p:cSld>
+    <p:bg>
+      <p:bgRef idx="1001">
+        <a:schemeClr val="bg1"/>
+      </p:bgRef>
+    </p:bg>
+    <p:spTree>
+      <p:nvGrpSpPr>
+        <p:cNvPr id="1" name=""/>
+        <p:cNvGrpSpPr/>
+        <p:nvPr/>
+      </p:nvGrpSpPr>
+      <p:grpSpPr>
+        <a:xfrm>
+          <a:off x="0" y="0"/>
+          <a:ext cx="0" cy="0"/>
+          <a:chOff x="0" y="0"/>
+          <a:chExt cx="0" cy="0"/>
+        </a:xfrm>
+      </p:grpSpPr>
+      <p:sp>
+        <p:nvSpPr>
+          <p:cNvPr id="2" name="Tijdelijke aanduiding voor koptekst 1"/>
+          <p:cNvSpPr>
+            <a:spLocks noGrp="1"/>
+          </p:cNvSpPr>
+          <p:nvPr>
+            <p:ph type="hdr" sz="quarter"/>
+          </p:nvPr>
+        </p:nvSpPr>
+        <p:spPr>
+          <a:xfrm>
+            <a:off x="0" y="0"/>
+            <a:ext cx="2971800" cy="458788"/>
+          </a:xfrm>
+          <a:prstGeom prst="rect">
+            <a:avLst/>
+          </a:prstGeom>
+        </p:spPr>
+        <p:txBody>
+          <a:bodyPr vert="horz" lIns="91440" tIns="45720" rIns="91440" bIns="45720" rtlCol="0"/>
+          <a:lstStyle>
+            <a:lvl1pPr algn="l">
+              <a:defRPr sz="1200"/>
+            </a:lvl1pPr>
+          </a:lstStyle>
+          <a:p>
+            <a:endParaRPr lang="nl-NL"/>
+          </a:p>
+        </p:txBody>
+      </p:sp>
+      <p:sp>
+        <p:nvSpPr>
+          <p:cNvPr id="3" name="Tijdelijke aanduiding voor datum 2"/>
+          <p:cNvSpPr>
+            <a:spLocks noGrp="1"/>
+          </p:cNvSpPr>
+          <p:nvPr>
+            <p:ph type="dt" idx="1"/>
+          </p:nvPr>
+        </p:nvSpPr>
+        <p:spPr>
+          <a:xfrm>
+            <a:off x="3884613" y="0"/>
+            <a:ext cx="2971800" cy="458788"/>
+          </a:xfrm>
+          <a:prstGeom prst="rect">
+            <a:avLst/>
+          </a:prstGeom>
+        </p:spPr>
+        <p:txBody>
+          <a:bodyPr vert="horz" lIns="91440" tIns="45720" rIns="91440" bIns="45720" rtlCol="0"/>
+          <a:lstStyle>
+            <a:lvl1pPr algn="r">
+              <a:defRPr sz="1200"/>
+            </a:lvl1pPr>
+          </a:lstStyle>
+          <a:p>
+            <a:fld id="{AF2A1E05-E974-4380-82C7-142D20023EC5}" type="datetimeFigureOut">
+              <a:rPr lang="nl-NL" smtClean="0"/>
+              <a:t>29-6-2015</a:t>
+            </a:fld>
+            <a:endParaRPr lang="nl-NL"/>
+          </a:p>
+        </p:txBody>
+      </p:sp>
+      <p:sp>
+        <p:nvSpPr>
+          <p:cNvPr id="4" name="Tijdelijke aanduiding voor dia-afbeelding 3"/>
+          <p:cNvSpPr>
+            <a:spLocks noGrp="1" noRot="1" noChangeAspect="1"/>
+          </p:cNvSpPr>
+          <p:nvPr>
+            <p:ph type="sldImg" idx="2"/>
+          </p:nvPr>
+        </p:nvSpPr>
+        <p:spPr>
+          <a:xfrm>
+            <a:off x="1371600" y="1143000"/>
+            <a:ext cx="4114800" cy="3086100"/>
+          </a:xfrm>
+          <a:prstGeom prst="rect">
+            <a:avLst/>
+          </a:prstGeom>
+          <a:noFill/>
+          <a:ln w="12700">
+            <a:solidFill>
+              <a:prstClr val="black"/>
+            </a:solidFill>
+          </a:ln>
+        </p:spPr>
+        <p:txBody>
+          <a:bodyPr vert="horz" lIns="91440" tIns="45720" rIns="91440" bIns="45720" rtlCol="0" anchor="ctr"/>
+          <a:lstStyle/>
+          <a:p>
+            <a:endParaRPr lang="nl-NL"/>
+          </a:p>
+        </p:txBody>
+      </p:sp>
+      <p:sp>
+        <p:nvSpPr>
+          <p:cNvPr id="5" name="Tijdelijke aanduiding voor notities 4"/>
+          <p:cNvSpPr>
+            <a:spLocks noGrp="1"/>
+          </p:cNvSpPr>
+          <p:nvPr>
+            <p:ph type="body" sz="quarter" idx="3"/>
+          </p:nvPr>
+        </p:nvSpPr>
+        <p:spPr>
+          <a:xfrm>
+            <a:off x="685800" y="4400550"/>
+            <a:ext cx="5486400" cy="3600450"/>
+          </a:xfrm>
+          <a:prstGeom prst="rect">
+            <a:avLst/>
+          </a:prstGeom>
+        </p:spPr>
+        <p:txBody>
+          <a:bodyPr vert="horz" lIns="91440" tIns="45720" rIns="91440" bIns="45720" rtlCol="0"/>
+          <a:lstStyle/>
+          <a:p>
+            <a:pPr lvl="0"/>
+            <a:r>
+              <a:rPr lang="nl-NL" smtClean="0"/>
+              <a:t>Klik om de modelstijlen te bewerken</a:t>
+            </a:r>
+          </a:p>
+          <a:p>
+            <a:pPr lvl="1"/>
+            <a:r>
+              <a:rPr lang="nl-NL" smtClean="0"/>
+              <a:t>Tweede niveau</a:t>
+            </a:r>
+          </a:p>
+          <a:p>
+            <a:pPr lvl="2"/>
+            <a:r>
+              <a:rPr lang="nl-NL" smtClean="0"/>
+              <a:t>Derde niveau</a:t>
+            </a:r>
+          </a:p>
+          <a:p>
+            <a:pPr lvl="3"/>
+            <a:r>
+              <a:rPr lang="nl-NL" smtClean="0"/>
+              <a:t>Vierde niveau</a:t>
+            </a:r>
+          </a:p>
+          <a:p>
+            <a:pPr lvl="4"/>
+            <a:r>
+              <a:rPr lang="nl-NL" smtClean="0"/>
+              <a:t>Vijfde niveau</a:t>
+            </a:r>
+            <a:endParaRPr lang="nl-NL"/>
+          </a:p>
+        </p:txBody>
+      </p:sp>
+      <p:sp>
+        <p:nvSpPr>
+          <p:cNvPr id="6" name="Tijdelijke aanduiding voor voettekst 5"/>
+          <p:cNvSpPr>
+            <a:spLocks noGrp="1"/>
+          </p:cNvSpPr>
+          <p:nvPr>
+            <p:ph type="ftr" sz="quarter" idx="4"/>
+          </p:nvPr>
+        </p:nvSpPr>
+        <p:spPr>
+          <a:xfrm>
+            <a:off x="0" y="8685213"/>
+            <a:ext cx="2971800" cy="458787"/>
+          </a:xfrm>
+          <a:prstGeom prst="rect">
+            <a:avLst/>
+          </a:prstGeom>
+        </p:spPr>
+        <p:txBody>
+          <a:bodyPr vert="horz" lIns="91440" tIns="45720" rIns="91440" bIns="45720" rtlCol="0" anchor="b"/>
+          <a:lstStyle>
+            <a:lvl1pPr algn="l">
+              <a:defRPr sz="1200"/>
+            </a:lvl1pPr>
+          </a:lstStyle>
+          <a:p>
+            <a:endParaRPr lang="nl-NL"/>
+          </a:p>
+        </p:txBody>
+      </p:sp>
+      <p:sp>
+        <p:nvSpPr>
+          <p:cNvPr id="7" name="Tijdelijke aanduiding voor dianummer 6"/>
+          <p:cNvSpPr>
+            <a:spLocks noGrp="1"/>
+          </p:cNvSpPr>
+          <p:nvPr>
+            <p:ph type="sldNum" sz="quarter" idx="5"/>
+          </p:nvPr>
+        </p:nvSpPr>
+        <p:spPr>
+          <a:xfrm>
+            <a:off x="3884613" y="8685213"/>
+            <a:ext cx="2971800" cy="458787"/>
+          </a:xfrm>
+          <a:prstGeom prst="rect">
+            <a:avLst/>
+          </a:prstGeom>
+        </p:spPr>
+        <p:txBody>
+          <a:bodyPr vert="horz" lIns="91440" tIns="45720" rIns="91440" bIns="45720" rtlCol="0" anchor="b"/>
+          <a:lstStyle>
+            <a:lvl1pPr algn="r">
+              <a:defRPr sz="1200"/>
+            </a:lvl1pPr>
+          </a:lstStyle>
+          <a:p>
+            <a:fld id="{158AD81D-3061-441A-B732-6B9A356D8602}" type="slidenum">
+              <a:rPr lang="nl-NL" smtClean="0"/>
+              <a:t>‹nr.›</a:t>
+            </a:fld>
+            <a:endParaRPr lang="nl-NL"/>
+          </a:p>
+        </p:txBody>
+      </p:sp>
+    </p:spTree>
+    <p:extLst>
+      <p:ext uri="{BB962C8B-B14F-4D97-AF65-F5344CB8AC3E}">
+        <p14:creationId xmlns:p14="http://schemas.microsoft.com/office/powerpoint/2010/main" val="2488459853"/>
+      </p:ext>
+    </p:extLst>
+  </p:cSld>
+  <p:clrMap bg1="lt1" tx1="dk1" bg2="lt2" tx2="dk2" accent1="accent1" accent2="accent2" accent3="accent3" accent4="accent4" accent5="accent5" accent6="accent6" hlink="hlink" folHlink="folHlink"/>
+  <p:notesStyle>
+    <a:lvl1pPr marL="0" algn="l" defTabSz="914400" rtl="0" eaLnBrk="1" latinLnBrk="0" hangingPunct="1">
+      <a:defRPr sz="1200" kern="1200">
+        <a:solidFill>
+          <a:schemeClr val="tx1"/>
+        </a:solidFill>
+        <a:latin typeface="+mn-lt"/>
+        <a:ea typeface="+mn-ea"/>
+        <a:cs typeface="+mn-cs"/>
+      </a:defRPr>
+    </a:lvl1pPr>
+    <a:lvl2pPr marL="457200" algn="l" defTabSz="914400" rtl="0" eaLnBrk="1" latinLnBrk="0" hangingPunct="1">
+      <a:defRPr sz="1200" kern="1200">
+        <a:solidFill>
+          <a:schemeClr val="tx1"/>
+        </a:solidFill>
+        <a:latin typeface="+mn-lt"/>
+        <a:ea typeface="+mn-ea"/>
+        <a:cs typeface="+mn-cs"/>
+      </a:defRPr>
+    </a:lvl2pPr>
+    <a:lvl3pPr marL="914400" algn="l" defTabSz="914400" rtl="0" eaLnBrk="1" latinLnBrk="0" hangingPunct="1">
+      <a:defRPr sz="1200" kern="1200">
+        <a:solidFill>
+          <a:schemeClr val="tx1"/>
+        </a:solidFill>
+        <a:latin typeface="+mn-lt"/>
+        <a:ea typeface="+mn-ea"/>
+        <a:cs typeface="+mn-cs"/>
+      </a:defRPr>
+    </a:lvl3pPr>
+    <a:lvl4pPr marL="1371600" algn="l" defTabSz="914400" rtl="0" eaLnBrk="1" latinLnBrk="0" hangingPunct="1">
+      <a:defRPr sz="1200" kern="1200">
+        <a:solidFill>
+          <a:schemeClr val="tx1"/>
+        </a:solidFill>
+        <a:latin typeface="+mn-lt"/>
+        <a:ea typeface="+mn-ea"/>
+        <a:cs typeface="+mn-cs"/>
+      </a:defRPr>
+    </a:lvl4pPr>
+    <a:lvl5pPr marL="1828800" algn="l" defTabSz="914400" rtl="0" eaLnBrk="1" latinLnBrk="0" hangingPunct="1">
+      <a:defRPr sz="1200" kern="1200">
+        <a:solidFill>
+          <a:schemeClr val="tx1"/>
+        </a:solidFill>
+        <a:latin typeface="+mn-lt"/>
+        <a:ea typeface="+mn-ea"/>
+        <a:cs typeface="+mn-cs"/>
+      </a:defRPr>
+    </a:lvl5pPr>
+    <a:lvl6pPr marL="2286000" algn="l" defTabSz="914400" rtl="0" eaLnBrk="1" latinLnBrk="0" hangingPunct="1">
+      <a:defRPr sz="1200" kern="1200">
+        <a:solidFill>
+          <a:schemeClr val="tx1"/>
+        </a:solidFill>
+        <a:latin typeface="+mn-lt"/>
+        <a:ea typeface="+mn-ea"/>
+        <a:cs typeface="+mn-cs"/>
+      </a:defRPr>
+    </a:lvl6pPr>
+    <a:lvl7pPr marL="2743200" algn="l" defTabSz="914400" rtl="0" eaLnBrk="1" latinLnBrk="0" hangingPunct="1">
+      <a:defRPr sz="1200" kern="1200">
+        <a:solidFill>
+          <a:schemeClr val="tx1"/>
+        </a:solidFill>
+        <a:latin typeface="+mn-lt"/>
+        <a:ea typeface="+mn-ea"/>
+        <a:cs typeface="+mn-cs"/>
+      </a:defRPr>
+    </a:lvl7pPr>
+    <a:lvl8pPr marL="3200400" algn="l" defTabSz="914400" rtl="0" eaLnBrk="1" latinLnBrk="0" hangingPunct="1">
+      <a:defRPr sz="1200" kern="1200">
+        <a:solidFill>
+          <a:schemeClr val="tx1"/>
+        </a:solidFill>
+        <a:latin typeface="+mn-lt"/>
+        <a:ea typeface="+mn-ea"/>
+        <a:cs typeface="+mn-cs"/>
+      </a:defRPr>
+    </a:lvl8pPr>
+    <a:lvl9pPr marL="3657600" algn="l" defTabSz="914400" rtl="0" eaLnBrk="1" latinLnBrk="0" hangingPunct="1">
+      <a:defRPr sz="1200" kern="1200">
+        <a:solidFill>
+          <a:schemeClr val="tx1"/>
+        </a:solidFill>
+        <a:latin typeface="+mn-lt"/>
+        <a:ea typeface="+mn-ea"/>
+        <a:cs typeface="+mn-cs"/>
+      </a:defRPr>
+    </a:lvl9pPr>
+  </p:notesStyle>
+</p:notesMaster>
+</file>
+
+<file path=ppt/notesSlides/notesSlide1.xml><?xml version="1.0" encoding="utf-8"?>
+<p:notes xmlns:a="http://schemas.openxmlformats.org/drawingml/2006/main" xmlns:r="http://schemas.openxmlformats.org/officeDocument/2006/relationships" xmlns:p="http://schemas.openxmlformats.org/presentationml/2006/main">
+  <p:cSld>
+    <p:spTree>
+      <p:nvGrpSpPr>
+        <p:cNvPr id="1" name=""/>
+        <p:cNvGrpSpPr/>
+        <p:nvPr/>
+      </p:nvGrpSpPr>
+      <p:grpSpPr>
+        <a:xfrm>
+          <a:off x="0" y="0"/>
+          <a:ext cx="0" cy="0"/>
+          <a:chOff x="0" y="0"/>
+          <a:chExt cx="0" cy="0"/>
+        </a:xfrm>
+      </p:grpSpPr>
+      <p:sp>
+        <p:nvSpPr>
+          <p:cNvPr id="2" name="Tijdelijke aanduiding voor dia-afbeelding 1"/>
+          <p:cNvSpPr>
+            <a:spLocks noGrp="1" noRot="1" noChangeAspect="1"/>
+          </p:cNvSpPr>
+          <p:nvPr>
+            <p:ph type="sldImg"/>
+          </p:nvPr>
+        </p:nvSpPr>
+        <p:spPr/>
+      </p:sp>
+      <p:sp>
+        <p:nvSpPr>
+          <p:cNvPr id="3" name="Tijdelijke aanduiding voor notities 2"/>
+          <p:cNvSpPr>
+            <a:spLocks noGrp="1"/>
+          </p:cNvSpPr>
+          <p:nvPr>
+            <p:ph type="body" idx="1"/>
+          </p:nvPr>
+        </p:nvSpPr>
+        <p:spPr/>
+        <p:txBody>
+          <a:bodyPr/>
+          <a:lstStyle/>
+          <a:p>
+            <a:endParaRPr lang="nl-NL" dirty="0"/>
+          </a:p>
+        </p:txBody>
+      </p:sp>
+      <p:sp>
+        <p:nvSpPr>
+          <p:cNvPr id="4" name="Tijdelijke aanduiding voor dianummer 3"/>
+          <p:cNvSpPr>
+            <a:spLocks noGrp="1"/>
+          </p:cNvSpPr>
+          <p:nvPr>
+            <p:ph type="sldNum" sz="quarter" idx="10"/>
+          </p:nvPr>
+        </p:nvSpPr>
+        <p:spPr/>
+        <p:txBody>
+          <a:bodyPr/>
+          <a:lstStyle/>
+          <a:p>
+            <a:fld id="{158AD81D-3061-441A-B732-6B9A356D8602}" type="slidenum">
+              <a:rPr lang="nl-NL" smtClean="0"/>
+              <a:t>3</a:t>
+            </a:fld>
+            <a:endParaRPr lang="nl-NL"/>
+          </a:p>
+        </p:txBody>
+      </p:sp>
+    </p:spTree>
+    <p:extLst>
+      <p:ext uri="{BB962C8B-B14F-4D97-AF65-F5344CB8AC3E}">
+        <p14:creationId xmlns:p14="http://schemas.microsoft.com/office/powerpoint/2010/main" val="1264833028"/>
+      </p:ext>
+    </p:extLst>
+  </p:cSld>
+  <p:clrMapOvr>
+    <a:masterClrMapping/>
+  </p:clrMapOvr>
+</p:notes>
 </file>
 
 <file path=ppt/slideLayouts/slideLayout1.xml><?xml version="1.0" encoding="utf-8"?>
@@ -289,7 +743,7 @@
           <a:p>
             <a:fld id="{2E5BAFD1-66B7-4D5A-B614-B7EE7B6EB2D0}" type="datetimeFigureOut">
               <a:rPr lang="en-US" smtClean="0"/>
-              <a:t>11/20/2013</a:t>
+              <a:t>6/28/2015</a:t>
             </a:fld>
             <a:endParaRPr lang="en-US"/>
           </a:p>
@@ -459,7 +913,7 @@
           <a:p>
             <a:fld id="{2E5BAFD1-66B7-4D5A-B614-B7EE7B6EB2D0}" type="datetimeFigureOut">
               <a:rPr lang="en-US" smtClean="0"/>
-              <a:t>11/20/2013</a:t>
+              <a:t>6/28/2015</a:t>
             </a:fld>
             <a:endParaRPr lang="en-US"/>
           </a:p>
@@ -639,7 +1093,7 @@
           <a:p>
             <a:fld id="{2E5BAFD1-66B7-4D5A-B614-B7EE7B6EB2D0}" type="datetimeFigureOut">
               <a:rPr lang="en-US" smtClean="0"/>
-              <a:t>11/20/2013</a:t>
+              <a:t>6/28/2015</a:t>
             </a:fld>
             <a:endParaRPr lang="en-US"/>
           </a:p>
@@ -809,7 +1263,7 @@
           <a:p>
             <a:fld id="{2E5BAFD1-66B7-4D5A-B614-B7EE7B6EB2D0}" type="datetimeFigureOut">
               <a:rPr lang="en-US" smtClean="0"/>
-              <a:t>11/20/2013</a:t>
+              <a:t>6/28/2015</a:t>
             </a:fld>
             <a:endParaRPr lang="en-US"/>
           </a:p>
@@ -1055,7 +1509,7 @@
           <a:p>
             <a:fld id="{2E5BAFD1-66B7-4D5A-B614-B7EE7B6EB2D0}" type="datetimeFigureOut">
               <a:rPr lang="en-US" smtClean="0"/>
-              <a:t>11/20/2013</a:t>
+              <a:t>6/28/2015</a:t>
             </a:fld>
             <a:endParaRPr lang="en-US"/>
           </a:p>
@@ -1343,7 +1797,7 @@
           <a:p>
             <a:fld id="{2E5BAFD1-66B7-4D5A-B614-B7EE7B6EB2D0}" type="datetimeFigureOut">
               <a:rPr lang="en-US" smtClean="0"/>
-              <a:t>11/20/2013</a:t>
+              <a:t>6/28/2015</a:t>
             </a:fld>
             <a:endParaRPr lang="en-US"/>
           </a:p>
@@ -1765,7 +2219,7 @@
           <a:p>
             <a:fld id="{2E5BAFD1-66B7-4D5A-B614-B7EE7B6EB2D0}" type="datetimeFigureOut">
               <a:rPr lang="en-US" smtClean="0"/>
-              <a:t>11/20/2013</a:t>
+              <a:t>6/28/2015</a:t>
             </a:fld>
             <a:endParaRPr lang="en-US"/>
           </a:p>
@@ -1883,7 +2337,7 @@
           <a:p>
             <a:fld id="{2E5BAFD1-66B7-4D5A-B614-B7EE7B6EB2D0}" type="datetimeFigureOut">
               <a:rPr lang="en-US" smtClean="0"/>
-              <a:t>11/20/2013</a:t>
+              <a:t>6/28/2015</a:t>
             </a:fld>
             <a:endParaRPr lang="en-US"/>
           </a:p>
@@ -1978,7 +2432,7 @@
           <a:p>
             <a:fld id="{2E5BAFD1-66B7-4D5A-B614-B7EE7B6EB2D0}" type="datetimeFigureOut">
               <a:rPr lang="en-US" smtClean="0"/>
-              <a:t>11/20/2013</a:t>
+              <a:t>6/28/2015</a:t>
             </a:fld>
             <a:endParaRPr lang="en-US"/>
           </a:p>
@@ -2255,7 +2709,7 @@
           <a:p>
             <a:fld id="{2E5BAFD1-66B7-4D5A-B614-B7EE7B6EB2D0}" type="datetimeFigureOut">
               <a:rPr lang="en-US" smtClean="0"/>
-              <a:t>11/20/2013</a:t>
+              <a:t>6/28/2015</a:t>
             </a:fld>
             <a:endParaRPr lang="en-US"/>
           </a:p>
@@ -2508,7 +2962,7 @@
           <a:p>
             <a:fld id="{2E5BAFD1-66B7-4D5A-B614-B7EE7B6EB2D0}" type="datetimeFigureOut">
               <a:rPr lang="en-US" smtClean="0"/>
-              <a:t>11/20/2013</a:t>
+              <a:t>6/28/2015</a:t>
             </a:fld>
             <a:endParaRPr lang="en-US"/>
           </a:p>
@@ -2721,7 +3175,7 @@
           <a:p>
             <a:fld id="{2E5BAFD1-66B7-4D5A-B614-B7EE7B6EB2D0}" type="datetimeFigureOut">
               <a:rPr lang="en-US" smtClean="0"/>
-              <a:t>11/20/2013</a:t>
+              <a:t>6/28/2015</a:t>
             </a:fld>
             <a:endParaRPr lang="en-US"/>
           </a:p>
@@ -5100,6 +5554,1366 @@
     <p:extLst>
       <p:ext uri="{BB962C8B-B14F-4D97-AF65-F5344CB8AC3E}">
         <p14:creationId xmlns:p14="http://schemas.microsoft.com/office/powerpoint/2010/main" val="2697518305"/>
+      </p:ext>
+    </p:extLst>
+  </p:cSld>
+  <p:clrMapOvr>
+    <a:masterClrMapping/>
+  </p:clrMapOvr>
+  <p:timing>
+    <p:tnLst>
+      <p:par>
+        <p:cTn id="1" dur="indefinite" restart="never" nodeType="tmRoot"/>
+      </p:par>
+    </p:tnLst>
+  </p:timing>
+</p:sld>
+</file>
+
+<file path=ppt/slides/slide3.xml><?xml version="1.0" encoding="utf-8"?>
+<p:sld xmlns:a="http://schemas.openxmlformats.org/drawingml/2006/main" xmlns:r="http://schemas.openxmlformats.org/officeDocument/2006/relationships" xmlns:p="http://schemas.openxmlformats.org/presentationml/2006/main">
+  <p:cSld>
+    <p:spTree>
+      <p:nvGrpSpPr>
+        <p:cNvPr id="1" name=""/>
+        <p:cNvGrpSpPr/>
+        <p:nvPr/>
+      </p:nvGrpSpPr>
+      <p:grpSpPr>
+        <a:xfrm>
+          <a:off x="0" y="0"/>
+          <a:ext cx="0" cy="0"/>
+          <a:chOff x="0" y="0"/>
+          <a:chExt cx="0" cy="0"/>
+        </a:xfrm>
+      </p:grpSpPr>
+      <p:sp>
+        <p:nvSpPr>
+          <p:cNvPr id="63" name="Stroomdiagram: Vooraf gedefinieerd proces 62"/>
+          <p:cNvSpPr/>
+          <p:nvPr/>
+        </p:nvSpPr>
+        <p:spPr>
+          <a:xfrm>
+            <a:off x="7283482" y="5650022"/>
+            <a:ext cx="1859999" cy="1042170"/>
+          </a:xfrm>
+          <a:prstGeom prst="flowChartPredefinedProcess">
+            <a:avLst/>
+          </a:prstGeom>
+        </p:spPr>
+        <p:style>
+          <a:lnRef idx="2">
+            <a:schemeClr val="accent1">
+              <a:shade val="50000"/>
+            </a:schemeClr>
+          </a:lnRef>
+          <a:fillRef idx="1">
+            <a:schemeClr val="accent1"/>
+          </a:fillRef>
+          <a:effectRef idx="0">
+            <a:schemeClr val="accent1"/>
+          </a:effectRef>
+          <a:fontRef idx="minor">
+            <a:schemeClr val="lt1"/>
+          </a:fontRef>
+        </p:style>
+        <p:txBody>
+          <a:bodyPr rtlCol="0" anchor="ctr"/>
+          <a:lstStyle/>
+          <a:p>
+            <a:pPr algn="ctr"/>
+            <a:r>
+              <a:rPr lang="nl-NL" dirty="0" smtClean="0"/>
+              <a:t>433MHz </a:t>
+            </a:r>
+            <a:r>
+              <a:rPr lang="nl-NL" dirty="0" err="1" smtClean="0"/>
+              <a:t>transceiver</a:t>
+            </a:r>
+            <a:endParaRPr lang="en-US" dirty="0"/>
+          </a:p>
+        </p:txBody>
+      </p:sp>
+      <p:sp>
+        <p:nvSpPr>
+          <p:cNvPr id="62" name="Stroomdiagram: Vooraf gedefinieerd proces 61"/>
+          <p:cNvSpPr/>
+          <p:nvPr/>
+        </p:nvSpPr>
+        <p:spPr>
+          <a:xfrm>
+            <a:off x="581613" y="5508133"/>
+            <a:ext cx="1859999" cy="1042170"/>
+          </a:xfrm>
+          <a:prstGeom prst="flowChartPredefinedProcess">
+            <a:avLst/>
+          </a:prstGeom>
+        </p:spPr>
+        <p:style>
+          <a:lnRef idx="2">
+            <a:schemeClr val="accent1">
+              <a:shade val="50000"/>
+            </a:schemeClr>
+          </a:lnRef>
+          <a:fillRef idx="1">
+            <a:schemeClr val="accent1"/>
+          </a:fillRef>
+          <a:effectRef idx="0">
+            <a:schemeClr val="accent1"/>
+          </a:effectRef>
+          <a:fontRef idx="minor">
+            <a:schemeClr val="lt1"/>
+          </a:fontRef>
+        </p:style>
+        <p:txBody>
+          <a:bodyPr rtlCol="0" anchor="ctr"/>
+          <a:lstStyle/>
+          <a:p>
+            <a:pPr algn="ctr"/>
+            <a:r>
+              <a:rPr lang="nl-NL" dirty="0" err="1" smtClean="0"/>
+              <a:t>Wired</a:t>
+            </a:r>
+            <a:endParaRPr lang="nl-NL" dirty="0" smtClean="0"/>
+          </a:p>
+          <a:p>
+            <a:pPr algn="ctr"/>
+            <a:r>
+              <a:rPr lang="nl-NL" dirty="0" smtClean="0"/>
+              <a:t>Sensor</a:t>
+            </a:r>
+            <a:endParaRPr lang="en-US" dirty="0"/>
+          </a:p>
+        </p:txBody>
+      </p:sp>
+      <p:sp>
+        <p:nvSpPr>
+          <p:cNvPr id="60" name="Stroomdiagram: Vooraf gedefinieerd proces 59"/>
+          <p:cNvSpPr/>
+          <p:nvPr/>
+        </p:nvSpPr>
+        <p:spPr>
+          <a:xfrm>
+            <a:off x="429213" y="5355733"/>
+            <a:ext cx="1859999" cy="1042170"/>
+          </a:xfrm>
+          <a:prstGeom prst="flowChartPredefinedProcess">
+            <a:avLst/>
+          </a:prstGeom>
+        </p:spPr>
+        <p:style>
+          <a:lnRef idx="2">
+            <a:schemeClr val="accent1">
+              <a:shade val="50000"/>
+            </a:schemeClr>
+          </a:lnRef>
+          <a:fillRef idx="1">
+            <a:schemeClr val="accent1"/>
+          </a:fillRef>
+          <a:effectRef idx="0">
+            <a:schemeClr val="accent1"/>
+          </a:effectRef>
+          <a:fontRef idx="minor">
+            <a:schemeClr val="lt1"/>
+          </a:fontRef>
+        </p:style>
+        <p:txBody>
+          <a:bodyPr rtlCol="0" anchor="ctr"/>
+          <a:lstStyle/>
+          <a:p>
+            <a:pPr algn="ctr"/>
+            <a:r>
+              <a:rPr lang="nl-NL" dirty="0" err="1" smtClean="0"/>
+              <a:t>Wired</a:t>
+            </a:r>
+            <a:endParaRPr lang="nl-NL" dirty="0" smtClean="0"/>
+          </a:p>
+          <a:p>
+            <a:pPr algn="ctr"/>
+            <a:r>
+              <a:rPr lang="nl-NL" dirty="0" smtClean="0"/>
+              <a:t>Sensor</a:t>
+            </a:r>
+            <a:endParaRPr lang="en-US" dirty="0"/>
+          </a:p>
+        </p:txBody>
+      </p:sp>
+      <p:sp>
+        <p:nvSpPr>
+          <p:cNvPr id="111" name="Afgeronde rechthoek 110"/>
+          <p:cNvSpPr/>
+          <p:nvPr/>
+        </p:nvSpPr>
+        <p:spPr>
+          <a:xfrm>
+            <a:off x="171823" y="2374031"/>
+            <a:ext cx="5701809" cy="1396450"/>
+          </a:xfrm>
+          <a:prstGeom prst="roundRect">
+            <a:avLst/>
+          </a:prstGeom>
+          <a:solidFill>
+            <a:schemeClr val="accent5">
+              <a:lumMod val="20000"/>
+              <a:lumOff val="80000"/>
+            </a:schemeClr>
+          </a:solidFill>
+          <a:ln>
+            <a:noFill/>
+          </a:ln>
+        </p:spPr>
+        <p:style>
+          <a:lnRef idx="2">
+            <a:schemeClr val="accent1">
+              <a:shade val="50000"/>
+            </a:schemeClr>
+          </a:lnRef>
+          <a:fillRef idx="1">
+            <a:schemeClr val="accent1"/>
+          </a:fillRef>
+          <a:effectRef idx="0">
+            <a:schemeClr val="accent1"/>
+          </a:effectRef>
+          <a:fontRef idx="minor">
+            <a:schemeClr val="lt1"/>
+          </a:fontRef>
+        </p:style>
+        <p:txBody>
+          <a:bodyPr rtlCol="0" anchor="ctr"/>
+          <a:lstStyle/>
+          <a:p>
+            <a:pPr algn="ctr"/>
+            <a:endParaRPr lang="en-US"/>
+          </a:p>
+        </p:txBody>
+      </p:sp>
+      <p:sp>
+        <p:nvSpPr>
+          <p:cNvPr id="42" name="Stroomdiagram: Magnetische schijf 41"/>
+          <p:cNvSpPr/>
+          <p:nvPr/>
+        </p:nvSpPr>
+        <p:spPr>
+          <a:xfrm>
+            <a:off x="5799168" y="5490263"/>
+            <a:ext cx="919336" cy="1236111"/>
+          </a:xfrm>
+          <a:prstGeom prst="flowChartMagneticDisk">
+            <a:avLst/>
+          </a:prstGeom>
+        </p:spPr>
+        <p:style>
+          <a:lnRef idx="2">
+            <a:schemeClr val="accent1">
+              <a:shade val="50000"/>
+            </a:schemeClr>
+          </a:lnRef>
+          <a:fillRef idx="1">
+            <a:schemeClr val="accent1"/>
+          </a:fillRef>
+          <a:effectRef idx="0">
+            <a:schemeClr val="accent1"/>
+          </a:effectRef>
+          <a:fontRef idx="minor">
+            <a:schemeClr val="lt1"/>
+          </a:fontRef>
+        </p:style>
+        <p:txBody>
+          <a:bodyPr rtlCol="0" anchor="ctr"/>
+          <a:lstStyle/>
+          <a:p>
+            <a:pPr algn="ctr"/>
+            <a:endParaRPr lang="en-US"/>
+          </a:p>
+        </p:txBody>
+      </p:sp>
+      <p:sp>
+        <p:nvSpPr>
+          <p:cNvPr id="10" name="Tekstvak 9"/>
+          <p:cNvSpPr txBox="1"/>
+          <p:nvPr/>
+        </p:nvSpPr>
+        <p:spPr>
+          <a:xfrm>
+            <a:off x="5865390" y="6028571"/>
+            <a:ext cx="845103" cy="369332"/>
+          </a:xfrm>
+          <a:prstGeom prst="rect">
+            <a:avLst/>
+          </a:prstGeom>
+          <a:noFill/>
+        </p:spPr>
+        <p:txBody>
+          <a:bodyPr wrap="none" rtlCol="0">
+            <a:spAutoFit/>
+          </a:bodyPr>
+          <a:lstStyle/>
+          <a:p>
+            <a:r>
+              <a:rPr lang="nl-NL" dirty="0" err="1" smtClean="0">
+                <a:solidFill>
+                  <a:schemeClr val="bg1"/>
+                </a:solidFill>
+              </a:rPr>
+              <a:t>MySQL</a:t>
+            </a:r>
+            <a:endParaRPr lang="en-US" dirty="0">
+              <a:solidFill>
+                <a:schemeClr val="bg1"/>
+              </a:solidFill>
+            </a:endParaRPr>
+          </a:p>
+        </p:txBody>
+      </p:sp>
+      <p:sp>
+        <p:nvSpPr>
+          <p:cNvPr id="20" name="Rechthoek 19"/>
+          <p:cNvSpPr/>
+          <p:nvPr/>
+        </p:nvSpPr>
+        <p:spPr>
+          <a:xfrm>
+            <a:off x="467544" y="404664"/>
+            <a:ext cx="1944216" cy="1080120"/>
+          </a:xfrm>
+          <a:prstGeom prst="rect">
+            <a:avLst/>
+          </a:prstGeom>
+          <a:solidFill>
+            <a:schemeClr val="bg2">
+              <a:lumMod val="90000"/>
+            </a:schemeClr>
+          </a:solidFill>
+        </p:spPr>
+        <p:style>
+          <a:lnRef idx="2">
+            <a:schemeClr val="accent1">
+              <a:shade val="50000"/>
+            </a:schemeClr>
+          </a:lnRef>
+          <a:fillRef idx="1">
+            <a:schemeClr val="accent1"/>
+          </a:fillRef>
+          <a:effectRef idx="0">
+            <a:schemeClr val="accent1"/>
+          </a:effectRef>
+          <a:fontRef idx="minor">
+            <a:schemeClr val="lt1"/>
+          </a:fontRef>
+        </p:style>
+        <p:txBody>
+          <a:bodyPr rtlCol="0" anchor="ctr"/>
+          <a:lstStyle/>
+          <a:p>
+            <a:pPr algn="ctr"/>
+            <a:r>
+              <a:rPr lang="nl-NL" dirty="0" smtClean="0"/>
+              <a:t>GUI </a:t>
+            </a:r>
+            <a:r>
+              <a:rPr lang="nl-NL" dirty="0" err="1" smtClean="0"/>
+              <a:t>Clients</a:t>
+            </a:r>
+            <a:endParaRPr lang="en-US" dirty="0"/>
+          </a:p>
+        </p:txBody>
+      </p:sp>
+      <p:sp>
+        <p:nvSpPr>
+          <p:cNvPr id="21" name="Rechthoek 20"/>
+          <p:cNvSpPr/>
+          <p:nvPr/>
+        </p:nvSpPr>
+        <p:spPr>
+          <a:xfrm>
+            <a:off x="619944" y="557064"/>
+            <a:ext cx="1944216" cy="1080120"/>
+          </a:xfrm>
+          <a:prstGeom prst="rect">
+            <a:avLst/>
+          </a:prstGeom>
+          <a:solidFill>
+            <a:schemeClr val="bg2">
+              <a:lumMod val="90000"/>
+            </a:schemeClr>
+          </a:solidFill>
+        </p:spPr>
+        <p:style>
+          <a:lnRef idx="2">
+            <a:schemeClr val="accent1">
+              <a:shade val="50000"/>
+            </a:schemeClr>
+          </a:lnRef>
+          <a:fillRef idx="1">
+            <a:schemeClr val="accent1"/>
+          </a:fillRef>
+          <a:effectRef idx="0">
+            <a:schemeClr val="accent1"/>
+          </a:effectRef>
+          <a:fontRef idx="minor">
+            <a:schemeClr val="lt1"/>
+          </a:fontRef>
+        </p:style>
+        <p:txBody>
+          <a:bodyPr rtlCol="0" anchor="ctr"/>
+          <a:lstStyle/>
+          <a:p>
+            <a:pPr algn="ctr"/>
+            <a:r>
+              <a:rPr lang="nl-NL" dirty="0" smtClean="0"/>
+              <a:t>GUI </a:t>
+            </a:r>
+            <a:r>
+              <a:rPr lang="nl-NL" dirty="0" err="1" smtClean="0"/>
+              <a:t>Clients</a:t>
+            </a:r>
+            <a:endParaRPr lang="en-US" dirty="0"/>
+          </a:p>
+        </p:txBody>
+      </p:sp>
+      <p:sp>
+        <p:nvSpPr>
+          <p:cNvPr id="22" name="Rechthoek 21"/>
+          <p:cNvSpPr/>
+          <p:nvPr/>
+        </p:nvSpPr>
+        <p:spPr>
+          <a:xfrm>
+            <a:off x="772344" y="709464"/>
+            <a:ext cx="1944216" cy="1080120"/>
+          </a:xfrm>
+          <a:prstGeom prst="rect">
+            <a:avLst/>
+          </a:prstGeom>
+          <a:solidFill>
+            <a:schemeClr val="bg2">
+              <a:lumMod val="90000"/>
+            </a:schemeClr>
+          </a:solidFill>
+        </p:spPr>
+        <p:style>
+          <a:lnRef idx="2">
+            <a:schemeClr val="accent1">
+              <a:shade val="50000"/>
+            </a:schemeClr>
+          </a:lnRef>
+          <a:fillRef idx="1">
+            <a:schemeClr val="accent1"/>
+          </a:fillRef>
+          <a:effectRef idx="0">
+            <a:schemeClr val="accent1"/>
+          </a:effectRef>
+          <a:fontRef idx="minor">
+            <a:schemeClr val="lt1"/>
+          </a:fontRef>
+        </p:style>
+        <p:txBody>
+          <a:bodyPr rtlCol="0" anchor="ctr"/>
+          <a:lstStyle/>
+          <a:p>
+            <a:pPr algn="ctr"/>
+            <a:r>
+              <a:rPr lang="nl-NL" dirty="0" smtClean="0"/>
+              <a:t>GUI </a:t>
+            </a:r>
+            <a:r>
+              <a:rPr lang="nl-NL" dirty="0" err="1" smtClean="0"/>
+              <a:t>Clients</a:t>
+            </a:r>
+            <a:endParaRPr lang="en-US" dirty="0"/>
+          </a:p>
+        </p:txBody>
+      </p:sp>
+      <p:sp>
+        <p:nvSpPr>
+          <p:cNvPr id="23" name="Rechthoek 22"/>
+          <p:cNvSpPr/>
+          <p:nvPr/>
+        </p:nvSpPr>
+        <p:spPr>
+          <a:xfrm>
+            <a:off x="924744" y="861864"/>
+            <a:ext cx="1944216" cy="1080120"/>
+          </a:xfrm>
+          <a:prstGeom prst="rect">
+            <a:avLst/>
+          </a:prstGeom>
+          <a:solidFill>
+            <a:schemeClr val="bg1">
+              <a:lumMod val="95000"/>
+            </a:schemeClr>
+          </a:solidFill>
+          <a:ln>
+            <a:solidFill>
+              <a:schemeClr val="tx2">
+                <a:lumMod val="75000"/>
+              </a:schemeClr>
+            </a:solidFill>
+          </a:ln>
+        </p:spPr>
+        <p:style>
+          <a:lnRef idx="2">
+            <a:schemeClr val="accent1">
+              <a:shade val="50000"/>
+            </a:schemeClr>
+          </a:lnRef>
+          <a:fillRef idx="1">
+            <a:schemeClr val="accent1"/>
+          </a:fillRef>
+          <a:effectRef idx="0">
+            <a:schemeClr val="accent1"/>
+          </a:effectRef>
+          <a:fontRef idx="minor">
+            <a:schemeClr val="lt1"/>
+          </a:fontRef>
+        </p:style>
+        <p:txBody>
+          <a:bodyPr rtlCol="0" anchor="ctr"/>
+          <a:lstStyle/>
+          <a:p>
+            <a:pPr algn="ctr"/>
+            <a:r>
+              <a:rPr lang="nl-NL" dirty="0" smtClean="0">
+                <a:solidFill>
+                  <a:schemeClr val="tx2">
+                    <a:lumMod val="75000"/>
+                  </a:schemeClr>
+                </a:solidFill>
+              </a:rPr>
+              <a:t>GUI </a:t>
+            </a:r>
+            <a:r>
+              <a:rPr lang="nl-NL" dirty="0" err="1" smtClean="0">
+                <a:solidFill>
+                  <a:schemeClr val="tx2">
+                    <a:lumMod val="75000"/>
+                  </a:schemeClr>
+                </a:solidFill>
+              </a:rPr>
+              <a:t>Clients</a:t>
+            </a:r>
+            <a:endParaRPr lang="en-US" dirty="0">
+              <a:solidFill>
+                <a:schemeClr val="tx2">
+                  <a:lumMod val="75000"/>
+                </a:schemeClr>
+              </a:solidFill>
+            </a:endParaRPr>
+          </a:p>
+        </p:txBody>
+      </p:sp>
+      <p:cxnSp>
+        <p:nvCxnSpPr>
+          <p:cNvPr id="28" name="Rechte verbindingslijn met pijl 27"/>
+          <p:cNvCxnSpPr/>
+          <p:nvPr/>
+        </p:nvCxnSpPr>
+        <p:spPr>
+          <a:xfrm flipV="1">
+            <a:off x="1115616" y="3211011"/>
+            <a:ext cx="0" cy="1813785"/>
+          </a:xfrm>
+          <a:prstGeom prst="straightConnector1">
+            <a:avLst/>
+          </a:prstGeom>
+          <a:ln w="15875">
+            <a:headEnd type="triangle"/>
+            <a:tailEnd type="triangle"/>
+          </a:ln>
+        </p:spPr>
+        <p:style>
+          <a:lnRef idx="1">
+            <a:schemeClr val="accent1"/>
+          </a:lnRef>
+          <a:fillRef idx="0">
+            <a:schemeClr val="accent1"/>
+          </a:fillRef>
+          <a:effectRef idx="0">
+            <a:schemeClr val="accent1"/>
+          </a:effectRef>
+          <a:fontRef idx="minor">
+            <a:schemeClr val="tx1"/>
+          </a:fontRef>
+        </p:style>
+      </p:cxnSp>
+      <p:sp>
+        <p:nvSpPr>
+          <p:cNvPr id="43" name="Stroomdiagram: Magnetische schijf 42"/>
+          <p:cNvSpPr/>
+          <p:nvPr/>
+        </p:nvSpPr>
+        <p:spPr>
+          <a:xfrm>
+            <a:off x="6726468" y="2592955"/>
+            <a:ext cx="919336" cy="1236111"/>
+          </a:xfrm>
+          <a:prstGeom prst="flowChartMagneticDisk">
+            <a:avLst/>
+          </a:prstGeom>
+        </p:spPr>
+        <p:style>
+          <a:lnRef idx="2">
+            <a:schemeClr val="accent1">
+              <a:shade val="50000"/>
+            </a:schemeClr>
+          </a:lnRef>
+          <a:fillRef idx="1">
+            <a:schemeClr val="accent1"/>
+          </a:fillRef>
+          <a:effectRef idx="0">
+            <a:schemeClr val="accent1"/>
+          </a:effectRef>
+          <a:fontRef idx="minor">
+            <a:schemeClr val="lt1"/>
+          </a:fontRef>
+        </p:style>
+        <p:txBody>
+          <a:bodyPr rtlCol="0" anchor="ctr"/>
+          <a:lstStyle/>
+          <a:p>
+            <a:pPr algn="ctr"/>
+            <a:endParaRPr lang="en-US"/>
+          </a:p>
+        </p:txBody>
+      </p:sp>
+      <p:sp>
+        <p:nvSpPr>
+          <p:cNvPr id="45" name="Tekstvak 44"/>
+          <p:cNvSpPr txBox="1"/>
+          <p:nvPr/>
+        </p:nvSpPr>
+        <p:spPr>
+          <a:xfrm>
+            <a:off x="6806056" y="3031404"/>
+            <a:ext cx="835742" cy="646331"/>
+          </a:xfrm>
+          <a:prstGeom prst="rect">
+            <a:avLst/>
+          </a:prstGeom>
+          <a:noFill/>
+        </p:spPr>
+        <p:txBody>
+          <a:bodyPr wrap="none" rtlCol="0">
+            <a:spAutoFit/>
+          </a:bodyPr>
+          <a:lstStyle/>
+          <a:p>
+            <a:r>
+              <a:rPr lang="nl-NL" dirty="0" err="1" smtClean="0">
+                <a:solidFill>
+                  <a:schemeClr val="bg1"/>
+                </a:solidFill>
+              </a:rPr>
+              <a:t>Config</a:t>
+            </a:r>
+            <a:r>
+              <a:rPr lang="nl-NL" dirty="0" smtClean="0">
+                <a:solidFill>
+                  <a:schemeClr val="bg1"/>
+                </a:solidFill>
+              </a:rPr>
+              <a:t> </a:t>
+            </a:r>
+          </a:p>
+          <a:p>
+            <a:r>
+              <a:rPr lang="nl-NL" dirty="0" smtClean="0">
+                <a:solidFill>
+                  <a:schemeClr val="bg1"/>
+                </a:solidFill>
+              </a:rPr>
+              <a:t>file</a:t>
+            </a:r>
+            <a:endParaRPr lang="en-US" dirty="0">
+              <a:solidFill>
+                <a:schemeClr val="bg1"/>
+              </a:solidFill>
+            </a:endParaRPr>
+          </a:p>
+        </p:txBody>
+      </p:sp>
+      <p:cxnSp>
+        <p:nvCxnSpPr>
+          <p:cNvPr id="46" name="Rechte verbindingslijn met pijl 45"/>
+          <p:cNvCxnSpPr/>
+          <p:nvPr/>
+        </p:nvCxnSpPr>
+        <p:spPr>
+          <a:xfrm>
+            <a:off x="3585068" y="3272123"/>
+            <a:ext cx="3254" cy="933839"/>
+          </a:xfrm>
+          <a:prstGeom prst="straightConnector1">
+            <a:avLst/>
+          </a:prstGeom>
+          <a:ln w="15875">
+            <a:headEnd type="triangle"/>
+            <a:tailEnd type="triangle"/>
+          </a:ln>
+        </p:spPr>
+        <p:style>
+          <a:lnRef idx="1">
+            <a:schemeClr val="accent1"/>
+          </a:lnRef>
+          <a:fillRef idx="0">
+            <a:schemeClr val="accent1"/>
+          </a:fillRef>
+          <a:effectRef idx="0">
+            <a:schemeClr val="accent1"/>
+          </a:effectRef>
+          <a:fontRef idx="minor">
+            <a:schemeClr val="tx1"/>
+          </a:fontRef>
+        </p:style>
+      </p:cxnSp>
+      <p:sp>
+        <p:nvSpPr>
+          <p:cNvPr id="51" name="Stroomdiagram: Alternatief proces 50"/>
+          <p:cNvSpPr/>
+          <p:nvPr/>
+        </p:nvSpPr>
+        <p:spPr>
+          <a:xfrm>
+            <a:off x="4923017" y="683515"/>
+            <a:ext cx="3952148" cy="1232520"/>
+          </a:xfrm>
+          <a:prstGeom prst="flowChartAlternateProcess">
+            <a:avLst/>
+          </a:prstGeom>
+          <a:solidFill>
+            <a:schemeClr val="accent6">
+              <a:lumMod val="60000"/>
+              <a:lumOff val="40000"/>
+            </a:schemeClr>
+          </a:solidFill>
+        </p:spPr>
+        <p:style>
+          <a:lnRef idx="2">
+            <a:schemeClr val="accent1">
+              <a:shade val="50000"/>
+            </a:schemeClr>
+          </a:lnRef>
+          <a:fillRef idx="1">
+            <a:schemeClr val="accent1"/>
+          </a:fillRef>
+          <a:effectRef idx="0">
+            <a:schemeClr val="accent1"/>
+          </a:effectRef>
+          <a:fontRef idx="minor">
+            <a:schemeClr val="lt1"/>
+          </a:fontRef>
+        </p:style>
+        <p:txBody>
+          <a:bodyPr rtlCol="0" anchor="ctr"/>
+          <a:lstStyle/>
+          <a:p>
+            <a:pPr algn="ctr"/>
+            <a:r>
+              <a:rPr lang="nl-NL" dirty="0" smtClean="0"/>
+              <a:t>LamPI-node.js</a:t>
+            </a:r>
+            <a:endParaRPr lang="en-US" dirty="0"/>
+          </a:p>
+        </p:txBody>
+      </p:sp>
+      <p:sp>
+        <p:nvSpPr>
+          <p:cNvPr id="56" name="Stroomdiagram: Vooraf gedefinieerd proces 55"/>
+          <p:cNvSpPr/>
+          <p:nvPr/>
+        </p:nvSpPr>
+        <p:spPr>
+          <a:xfrm>
+            <a:off x="6948264" y="5497622"/>
+            <a:ext cx="2042817" cy="1042170"/>
+          </a:xfrm>
+          <a:prstGeom prst="flowChartPredefinedProcess">
+            <a:avLst/>
+          </a:prstGeom>
+        </p:spPr>
+        <p:style>
+          <a:lnRef idx="2">
+            <a:schemeClr val="accent1">
+              <a:shade val="50000"/>
+            </a:schemeClr>
+          </a:lnRef>
+          <a:fillRef idx="1">
+            <a:schemeClr val="accent1"/>
+          </a:fillRef>
+          <a:effectRef idx="0">
+            <a:schemeClr val="accent1"/>
+          </a:effectRef>
+          <a:fontRef idx="minor">
+            <a:schemeClr val="lt1"/>
+          </a:fontRef>
+        </p:style>
+        <p:txBody>
+          <a:bodyPr rtlCol="0" anchor="ctr"/>
+          <a:lstStyle/>
+          <a:p>
+            <a:pPr algn="ctr"/>
+            <a:r>
+              <a:rPr lang="nl-NL" dirty="0" smtClean="0"/>
+              <a:t>433MHz </a:t>
+            </a:r>
+            <a:r>
+              <a:rPr lang="nl-NL" dirty="0" err="1" smtClean="0"/>
+              <a:t>Devices</a:t>
+            </a:r>
+            <a:endParaRPr lang="en-US" dirty="0"/>
+          </a:p>
+        </p:txBody>
+      </p:sp>
+      <p:cxnSp>
+        <p:nvCxnSpPr>
+          <p:cNvPr id="74" name="Rechte verbindingslijn met pijl 73"/>
+          <p:cNvCxnSpPr/>
+          <p:nvPr/>
+        </p:nvCxnSpPr>
+        <p:spPr>
+          <a:xfrm flipH="1" flipV="1">
+            <a:off x="3013168" y="1325725"/>
+            <a:ext cx="1702848" cy="15043"/>
+          </a:xfrm>
+          <a:prstGeom prst="straightConnector1">
+            <a:avLst/>
+          </a:prstGeom>
+          <a:ln w="15875">
+            <a:headEnd type="triangle"/>
+            <a:tailEnd type="triangle"/>
+          </a:ln>
+        </p:spPr>
+        <p:style>
+          <a:lnRef idx="1">
+            <a:schemeClr val="accent1"/>
+          </a:lnRef>
+          <a:fillRef idx="0">
+            <a:schemeClr val="accent1"/>
+          </a:fillRef>
+          <a:effectRef idx="0">
+            <a:schemeClr val="accent1"/>
+          </a:effectRef>
+          <a:fontRef idx="minor">
+            <a:schemeClr val="tx1"/>
+          </a:fontRef>
+        </p:style>
+      </p:cxnSp>
+      <p:sp>
+        <p:nvSpPr>
+          <p:cNvPr id="76" name="Afgeronde rechthoek 75"/>
+          <p:cNvSpPr/>
+          <p:nvPr/>
+        </p:nvSpPr>
+        <p:spPr>
+          <a:xfrm>
+            <a:off x="7158119" y="4218914"/>
+            <a:ext cx="1844201" cy="432048"/>
+          </a:xfrm>
+          <a:prstGeom prst="roundRect">
+            <a:avLst/>
+          </a:prstGeom>
+        </p:spPr>
+        <p:style>
+          <a:lnRef idx="2">
+            <a:schemeClr val="accent1">
+              <a:shade val="50000"/>
+            </a:schemeClr>
+          </a:lnRef>
+          <a:fillRef idx="1">
+            <a:schemeClr val="accent1"/>
+          </a:fillRef>
+          <a:effectRef idx="0">
+            <a:schemeClr val="accent1"/>
+          </a:effectRef>
+          <a:fontRef idx="minor">
+            <a:schemeClr val="lt1"/>
+          </a:fontRef>
+        </p:style>
+        <p:txBody>
+          <a:bodyPr rtlCol="0" anchor="ctr"/>
+          <a:lstStyle/>
+          <a:p>
+            <a:pPr algn="ctr"/>
+            <a:r>
+              <a:rPr lang="nl-NL" dirty="0" err="1" smtClean="0"/>
+              <a:t>Cmdline</a:t>
+            </a:r>
+            <a:r>
+              <a:rPr lang="nl-NL" dirty="0" smtClean="0"/>
+              <a:t> </a:t>
+            </a:r>
+            <a:r>
+              <a:rPr lang="nl-NL" dirty="0" err="1" smtClean="0"/>
+              <a:t>Exe</a:t>
+            </a:r>
+            <a:endParaRPr lang="en-US" dirty="0"/>
+          </a:p>
+        </p:txBody>
+      </p:sp>
+      <p:cxnSp>
+        <p:nvCxnSpPr>
+          <p:cNvPr id="80" name="Rechte verbindingslijn met pijl 79"/>
+          <p:cNvCxnSpPr/>
+          <p:nvPr/>
+        </p:nvCxnSpPr>
+        <p:spPr>
+          <a:xfrm flipV="1">
+            <a:off x="8100394" y="2167438"/>
+            <a:ext cx="0" cy="1837626"/>
+          </a:xfrm>
+          <a:prstGeom prst="straightConnector1">
+            <a:avLst/>
+          </a:prstGeom>
+          <a:ln w="15875">
+            <a:headEnd type="triangle"/>
+            <a:tailEnd type="triangle"/>
+          </a:ln>
+        </p:spPr>
+        <p:style>
+          <a:lnRef idx="1">
+            <a:schemeClr val="accent1"/>
+          </a:lnRef>
+          <a:fillRef idx="0">
+            <a:schemeClr val="accent1"/>
+          </a:fillRef>
+          <a:effectRef idx="0">
+            <a:schemeClr val="accent1"/>
+          </a:effectRef>
+          <a:fontRef idx="minor">
+            <a:schemeClr val="tx1"/>
+          </a:fontRef>
+        </p:style>
+      </p:cxnSp>
+      <p:sp>
+        <p:nvSpPr>
+          <p:cNvPr id="87" name="Wolkvormige toelichting 86"/>
+          <p:cNvSpPr/>
+          <p:nvPr/>
+        </p:nvSpPr>
+        <p:spPr>
+          <a:xfrm>
+            <a:off x="7137027" y="4882892"/>
+            <a:ext cx="1895900" cy="488392"/>
+          </a:xfrm>
+          <a:prstGeom prst="cloudCallout">
+            <a:avLst/>
+          </a:prstGeom>
+          <a:solidFill>
+            <a:schemeClr val="accent5">
+              <a:lumMod val="20000"/>
+              <a:lumOff val="80000"/>
+            </a:schemeClr>
+          </a:solidFill>
+        </p:spPr>
+        <p:style>
+          <a:lnRef idx="2">
+            <a:schemeClr val="accent1">
+              <a:shade val="50000"/>
+            </a:schemeClr>
+          </a:lnRef>
+          <a:fillRef idx="1">
+            <a:schemeClr val="accent1"/>
+          </a:fillRef>
+          <a:effectRef idx="0">
+            <a:schemeClr val="accent1"/>
+          </a:effectRef>
+          <a:fontRef idx="minor">
+            <a:schemeClr val="lt1"/>
+          </a:fontRef>
+        </p:style>
+        <p:txBody>
+          <a:bodyPr rtlCol="0" anchor="ctr"/>
+          <a:lstStyle/>
+          <a:p>
+            <a:pPr algn="ctr"/>
+            <a:endParaRPr lang="en-US"/>
+          </a:p>
+        </p:txBody>
+      </p:sp>
+      <p:cxnSp>
+        <p:nvCxnSpPr>
+          <p:cNvPr id="66" name="Rechte verbindingslijn met pijl 65"/>
+          <p:cNvCxnSpPr/>
+          <p:nvPr/>
+        </p:nvCxnSpPr>
+        <p:spPr>
+          <a:xfrm rot="16200000" flipV="1">
+            <a:off x="7358236" y="4415035"/>
+            <a:ext cx="836244" cy="648071"/>
+          </a:xfrm>
+          <a:prstGeom prst="curvedConnector3">
+            <a:avLst>
+              <a:gd name="adj1" fmla="val 50000"/>
+            </a:avLst>
+          </a:prstGeom>
+          <a:ln w="15875">
+            <a:headEnd type="triangle" w="lg" len="lg"/>
+            <a:tailEnd type="none"/>
+          </a:ln>
+        </p:spPr>
+        <p:style>
+          <a:lnRef idx="1">
+            <a:schemeClr val="accent1"/>
+          </a:lnRef>
+          <a:fillRef idx="0">
+            <a:schemeClr val="accent1"/>
+          </a:fillRef>
+          <a:effectRef idx="0">
+            <a:schemeClr val="accent1"/>
+          </a:effectRef>
+          <a:fontRef idx="minor">
+            <a:schemeClr val="tx1"/>
+          </a:fontRef>
+        </p:style>
+      </p:cxnSp>
+      <p:sp>
+        <p:nvSpPr>
+          <p:cNvPr id="107" name="Tekstvak 106"/>
+          <p:cNvSpPr txBox="1"/>
+          <p:nvPr/>
+        </p:nvSpPr>
+        <p:spPr>
+          <a:xfrm>
+            <a:off x="1772912" y="2355745"/>
+            <a:ext cx="2722668" cy="369332"/>
+          </a:xfrm>
+          <a:prstGeom prst="rect">
+            <a:avLst/>
+          </a:prstGeom>
+          <a:noFill/>
+        </p:spPr>
+        <p:txBody>
+          <a:bodyPr wrap="none" rtlCol="0">
+            <a:spAutoFit/>
+          </a:bodyPr>
+          <a:lstStyle/>
+          <a:p>
+            <a:r>
+              <a:rPr lang="nl-NL" dirty="0" smtClean="0"/>
+              <a:t>UDP IP bus </a:t>
+            </a:r>
+            <a:r>
+              <a:rPr lang="nl-NL" dirty="0" err="1" smtClean="0"/>
+              <a:t>communication</a:t>
+            </a:r>
+            <a:endParaRPr lang="en-US" dirty="0"/>
+          </a:p>
+        </p:txBody>
+      </p:sp>
+      <p:sp>
+        <p:nvSpPr>
+          <p:cNvPr id="117" name="Tekstvak 116"/>
+          <p:cNvSpPr txBox="1"/>
+          <p:nvPr/>
+        </p:nvSpPr>
+        <p:spPr>
+          <a:xfrm>
+            <a:off x="3075961" y="910150"/>
+            <a:ext cx="1270861" cy="369332"/>
+          </a:xfrm>
+          <a:prstGeom prst="rect">
+            <a:avLst/>
+          </a:prstGeom>
+          <a:noFill/>
+        </p:spPr>
+        <p:txBody>
+          <a:bodyPr wrap="none" rtlCol="0">
+            <a:spAutoFit/>
+          </a:bodyPr>
+          <a:lstStyle/>
+          <a:p>
+            <a:r>
+              <a:rPr lang="nl-NL" dirty="0" err="1" smtClean="0"/>
+              <a:t>websockets</a:t>
+            </a:r>
+            <a:endParaRPr lang="en-US" dirty="0"/>
+          </a:p>
+        </p:txBody>
+      </p:sp>
+      <p:cxnSp>
+        <p:nvCxnSpPr>
+          <p:cNvPr id="52" name="Rechte verbindingslijn met pijl 51"/>
+          <p:cNvCxnSpPr/>
+          <p:nvPr/>
+        </p:nvCxnSpPr>
+        <p:spPr>
+          <a:xfrm flipV="1">
+            <a:off x="7180745" y="2129885"/>
+            <a:ext cx="0" cy="327329"/>
+          </a:xfrm>
+          <a:prstGeom prst="straightConnector1">
+            <a:avLst/>
+          </a:prstGeom>
+          <a:ln w="15875">
+            <a:headEnd type="triangle"/>
+            <a:tailEnd type="triangle"/>
+          </a:ln>
+        </p:spPr>
+        <p:style>
+          <a:lnRef idx="1">
+            <a:schemeClr val="accent1"/>
+          </a:lnRef>
+          <a:fillRef idx="0">
+            <a:schemeClr val="accent1"/>
+          </a:fillRef>
+          <a:effectRef idx="0">
+            <a:schemeClr val="accent1"/>
+          </a:effectRef>
+          <a:fontRef idx="minor">
+            <a:schemeClr val="tx1"/>
+          </a:fontRef>
+        </p:style>
+      </p:cxnSp>
+      <p:sp>
+        <p:nvSpPr>
+          <p:cNvPr id="58" name="Stroomdiagram: Vooraf gedefinieerd proces 57"/>
+          <p:cNvSpPr/>
+          <p:nvPr/>
+        </p:nvSpPr>
+        <p:spPr>
+          <a:xfrm>
+            <a:off x="270360" y="5197652"/>
+            <a:ext cx="1859999" cy="1042170"/>
+          </a:xfrm>
+          <a:prstGeom prst="flowChartPredefinedProcess">
+            <a:avLst/>
+          </a:prstGeom>
+        </p:spPr>
+        <p:style>
+          <a:lnRef idx="2">
+            <a:schemeClr val="accent1">
+              <a:shade val="50000"/>
+            </a:schemeClr>
+          </a:lnRef>
+          <a:fillRef idx="1">
+            <a:schemeClr val="accent1"/>
+          </a:fillRef>
+          <a:effectRef idx="0">
+            <a:schemeClr val="accent1"/>
+          </a:effectRef>
+          <a:fontRef idx="minor">
+            <a:schemeClr val="lt1"/>
+          </a:fontRef>
+        </p:style>
+        <p:txBody>
+          <a:bodyPr rtlCol="0" anchor="ctr"/>
+          <a:lstStyle/>
+          <a:p>
+            <a:pPr algn="ctr"/>
+            <a:r>
+              <a:rPr lang="nl-NL" dirty="0" err="1" smtClean="0"/>
+              <a:t>Wired</a:t>
+            </a:r>
+            <a:endParaRPr lang="nl-NL" dirty="0" smtClean="0"/>
+          </a:p>
+          <a:p>
+            <a:pPr algn="ctr"/>
+            <a:r>
+              <a:rPr lang="nl-NL" dirty="0" smtClean="0"/>
+              <a:t> I2C Sensors</a:t>
+            </a:r>
+            <a:endParaRPr lang="en-US" dirty="0"/>
+          </a:p>
+        </p:txBody>
+      </p:sp>
+      <p:cxnSp>
+        <p:nvCxnSpPr>
+          <p:cNvPr id="59" name="Rechte verbindingslijn met pijl 58"/>
+          <p:cNvCxnSpPr/>
+          <p:nvPr/>
+        </p:nvCxnSpPr>
+        <p:spPr>
+          <a:xfrm flipV="1">
+            <a:off x="6228184" y="2112591"/>
+            <a:ext cx="0" cy="3258693"/>
+          </a:xfrm>
+          <a:prstGeom prst="straightConnector1">
+            <a:avLst/>
+          </a:prstGeom>
+          <a:ln w="15875">
+            <a:headEnd type="triangle"/>
+            <a:tailEnd type="triangle"/>
+          </a:ln>
+        </p:spPr>
+        <p:style>
+          <a:lnRef idx="1">
+            <a:schemeClr val="accent1"/>
+          </a:lnRef>
+          <a:fillRef idx="0">
+            <a:schemeClr val="accent1"/>
+          </a:fillRef>
+          <a:effectRef idx="0">
+            <a:schemeClr val="accent1"/>
+          </a:effectRef>
+          <a:fontRef idx="minor">
+            <a:schemeClr val="tx1"/>
+          </a:fontRef>
+        </p:style>
+      </p:cxnSp>
+      <p:cxnSp>
+        <p:nvCxnSpPr>
+          <p:cNvPr id="64" name="Rechte verbindingslijn met pijl 63"/>
+          <p:cNvCxnSpPr>
+            <a:endCxn id="111" idx="1"/>
+          </p:cNvCxnSpPr>
+          <p:nvPr/>
+        </p:nvCxnSpPr>
+        <p:spPr>
+          <a:xfrm flipH="1">
+            <a:off x="171823" y="3052930"/>
+            <a:ext cx="5558078" cy="19326"/>
+          </a:xfrm>
+          <a:prstGeom prst="straightConnector1">
+            <a:avLst/>
+          </a:prstGeom>
+          <a:ln w="57150">
+            <a:headEnd type="triangle"/>
+            <a:tailEnd type="triangle"/>
+          </a:ln>
+        </p:spPr>
+        <p:style>
+          <a:lnRef idx="1">
+            <a:schemeClr val="accent1"/>
+          </a:lnRef>
+          <a:fillRef idx="0">
+            <a:schemeClr val="accent1"/>
+          </a:fillRef>
+          <a:effectRef idx="0">
+            <a:schemeClr val="accent1"/>
+          </a:effectRef>
+          <a:fontRef idx="minor">
+            <a:schemeClr val="tx1"/>
+          </a:fontRef>
+        </p:style>
+      </p:cxnSp>
+      <p:cxnSp>
+        <p:nvCxnSpPr>
+          <p:cNvPr id="68" name="Rechte verbindingslijn met pijl 67"/>
+          <p:cNvCxnSpPr/>
+          <p:nvPr/>
+        </p:nvCxnSpPr>
+        <p:spPr>
+          <a:xfrm flipV="1">
+            <a:off x="1268016" y="3363411"/>
+            <a:ext cx="0" cy="1813785"/>
+          </a:xfrm>
+          <a:prstGeom prst="straightConnector1">
+            <a:avLst/>
+          </a:prstGeom>
+          <a:ln w="15875">
+            <a:headEnd type="triangle"/>
+            <a:tailEnd type="triangle"/>
+          </a:ln>
+        </p:spPr>
+        <p:style>
+          <a:lnRef idx="1">
+            <a:schemeClr val="accent1"/>
+          </a:lnRef>
+          <a:fillRef idx="0">
+            <a:schemeClr val="accent1"/>
+          </a:fillRef>
+          <a:effectRef idx="0">
+            <a:schemeClr val="accent1"/>
+          </a:effectRef>
+          <a:fontRef idx="minor">
+            <a:schemeClr val="tx1"/>
+          </a:fontRef>
+        </p:style>
+      </p:cxnSp>
+      <p:sp>
+        <p:nvSpPr>
+          <p:cNvPr id="69" name="Stroomdiagram: Vooraf gedefinieerd proces 68"/>
+          <p:cNvSpPr/>
+          <p:nvPr/>
+        </p:nvSpPr>
+        <p:spPr>
+          <a:xfrm>
+            <a:off x="2604507" y="4320948"/>
+            <a:ext cx="1859999" cy="1042170"/>
+          </a:xfrm>
+          <a:prstGeom prst="flowChartPredefinedProcess">
+            <a:avLst/>
+          </a:prstGeom>
+        </p:spPr>
+        <p:style>
+          <a:lnRef idx="2">
+            <a:schemeClr val="accent1">
+              <a:shade val="50000"/>
+            </a:schemeClr>
+          </a:lnRef>
+          <a:fillRef idx="1">
+            <a:schemeClr val="accent1"/>
+          </a:fillRef>
+          <a:effectRef idx="0">
+            <a:schemeClr val="accent1"/>
+          </a:effectRef>
+          <a:fontRef idx="minor">
+            <a:schemeClr val="lt1"/>
+          </a:fontRef>
+        </p:style>
+        <p:txBody>
+          <a:bodyPr rtlCol="0" anchor="ctr"/>
+          <a:lstStyle/>
+          <a:p>
+            <a:pPr algn="ctr"/>
+            <a:r>
+              <a:rPr lang="nl-NL" dirty="0" err="1" smtClean="0"/>
+              <a:t>Wired</a:t>
+            </a:r>
+            <a:r>
+              <a:rPr lang="nl-NL" dirty="0" smtClean="0"/>
+              <a:t> 1W</a:t>
+            </a:r>
+          </a:p>
+          <a:p>
+            <a:pPr algn="ctr"/>
+            <a:r>
+              <a:rPr lang="nl-NL" dirty="0" smtClean="0"/>
+              <a:t>Sensors</a:t>
+            </a:r>
+            <a:endParaRPr lang="en-US" dirty="0"/>
+          </a:p>
+        </p:txBody>
+      </p:sp>
+      <p:cxnSp>
+        <p:nvCxnSpPr>
+          <p:cNvPr id="73" name="Rechte verbindingslijn met pijl 72"/>
+          <p:cNvCxnSpPr/>
+          <p:nvPr/>
+        </p:nvCxnSpPr>
+        <p:spPr>
+          <a:xfrm flipV="1">
+            <a:off x="5364088" y="2112592"/>
+            <a:ext cx="0" cy="612485"/>
+          </a:xfrm>
+          <a:prstGeom prst="straightConnector1">
+            <a:avLst/>
+          </a:prstGeom>
+          <a:ln w="15875">
+            <a:headEnd type="triangle"/>
+            <a:tailEnd type="triangle"/>
+          </a:ln>
+        </p:spPr>
+        <p:style>
+          <a:lnRef idx="1">
+            <a:schemeClr val="accent1"/>
+          </a:lnRef>
+          <a:fillRef idx="0">
+            <a:schemeClr val="accent1"/>
+          </a:fillRef>
+          <a:effectRef idx="0">
+            <a:schemeClr val="accent1"/>
+          </a:effectRef>
+          <a:fontRef idx="minor">
+            <a:schemeClr val="tx1"/>
+          </a:fontRef>
+        </p:style>
+      </p:cxnSp>
+    </p:spTree>
+    <p:extLst>
+      <p:ext uri="{BB962C8B-B14F-4D97-AF65-F5344CB8AC3E}">
+        <p14:creationId xmlns:p14="http://schemas.microsoft.com/office/powerpoint/2010/main" val="224036832"/>
       </p:ext>
     </p:extLst>
   </p:cSld>
@@ -5399,4 +7213,265 @@
   <a:objectDefaults/>
   <a:extraClrSchemeLst/>
 </a:theme>
+</file>
+
+<file path=ppt/theme/theme2.xml><?xml version="1.0" encoding="utf-8"?>
+<a:theme xmlns:a="http://schemas.openxmlformats.org/drawingml/2006/main" name="Kantoorthema">
+  <a:themeElements>
+    <a:clrScheme name="Kantoor">
+      <a:dk1>
+        <a:sysClr val="windowText" lastClr="000000"/>
+      </a:dk1>
+      <a:lt1>
+        <a:sysClr val="window" lastClr="FFFFFF"/>
+      </a:lt1>
+      <a:dk2>
+        <a:srgbClr val="44546A"/>
+      </a:dk2>
+      <a:lt2>
+        <a:srgbClr val="E7E6E6"/>
+      </a:lt2>
+      <a:accent1>
+        <a:srgbClr val="5B9BD5"/>
+      </a:accent1>
+      <a:accent2>
+        <a:srgbClr val="ED7D31"/>
+      </a:accent2>
+      <a:accent3>
+        <a:srgbClr val="A5A5A5"/>
+      </a:accent3>
+      <a:accent4>
+        <a:srgbClr val="FFC000"/>
+      </a:accent4>
+      <a:accent5>
+        <a:srgbClr val="4472C4"/>
+      </a:accent5>
+      <a:accent6>
+        <a:srgbClr val="70AD47"/>
+      </a:accent6>
+      <a:hlink>
+        <a:srgbClr val="0563C1"/>
+      </a:hlink>
+      <a:folHlink>
+        <a:srgbClr val="954F72"/>
+      </a:folHlink>
+    </a:clrScheme>
+    <a:fontScheme name="Kantoor">
+      <a:majorFont>
+        <a:latin typeface="Calibri Light" panose="020F0302020204030204"/>
+        <a:ea typeface=""/>
+        <a:cs typeface=""/>
+        <a:font script="Jpan" typeface="ＭＳ Ｐゴシック"/>
+        <a:font script="Hang" typeface="맑은 고딕"/>
+        <a:font script="Hans" typeface="宋体"/>
+        <a:font script="Hant" typeface="新細明體"/>
+        <a:font script="Arab" typeface="Times New Roman"/>
+        <a:font script="Hebr" typeface="Times New Roman"/>
+        <a:font script="Thai" typeface="Angsana New"/>
+        <a:font script="Ethi" typeface="Nyala"/>
+        <a:font script="Beng" typeface="Vrinda"/>
+        <a:font script="Gujr" typeface="Shruti"/>
+        <a:font script="Khmr" typeface="MoolBoran"/>
+        <a:font script="Knda" typeface="Tunga"/>
+        <a:font script="Guru" typeface="Raavi"/>
+        <a:font script="Cans" typeface="Euphemia"/>
+        <a:font script="Cher" typeface="Plantagenet Cherokee"/>
+        <a:font script="Yiii" typeface="Microsoft Yi Baiti"/>
+        <a:font script="Tibt" typeface="Microsoft Himalaya"/>
+        <a:font script="Thaa" typeface="MV Boli"/>
+        <a:font script="Deva" typeface="Mangal"/>
+        <a:font script="Telu" typeface="Gautami"/>
+        <a:font script="Taml" typeface="Latha"/>
+        <a:font script="Syrc" typeface="Estrangelo Edessa"/>
+        <a:font script="Orya" typeface="Kalinga"/>
+        <a:font script="Mlym" typeface="Kartika"/>
+        <a:font script="Laoo" typeface="DokChampa"/>
+        <a:font script="Sinh" typeface="Iskoola Pota"/>
+        <a:font script="Mong" typeface="Mongolian Baiti"/>
+        <a:font script="Viet" typeface="Times New Roman"/>
+        <a:font script="Uigh" typeface="Microsoft Uighur"/>
+        <a:font script="Geor" typeface="Sylfaen"/>
+      </a:majorFont>
+      <a:minorFont>
+        <a:latin typeface="Calibri" panose="020F0502020204030204"/>
+        <a:ea typeface=""/>
+        <a:cs typeface=""/>
+        <a:font script="Jpan" typeface="ＭＳ Ｐゴシック"/>
+        <a:font script="Hang" typeface="맑은 고딕"/>
+        <a:font script="Hans" typeface="宋体"/>
+        <a:font script="Hant" typeface="新細明體"/>
+        <a:font script="Arab" typeface="Arial"/>
+        <a:font script="Hebr" typeface="Arial"/>
+        <a:font script="Thai" typeface="Cordia New"/>
+        <a:font script="Ethi" typeface="Nyala"/>
+        <a:font script="Beng" typeface="Vrinda"/>
+        <a:font script="Gujr" typeface="Shruti"/>
+        <a:font script="Khmr" typeface="DaunPenh"/>
+        <a:font script="Knda" typeface="Tunga"/>
+        <a:font script="Guru" typeface="Raavi"/>
+        <a:font script="Cans" typeface="Euphemia"/>
+        <a:font script="Cher" typeface="Plantagenet Cherokee"/>
+        <a:font script="Yiii" typeface="Microsoft Yi Baiti"/>
+        <a:font script="Tibt" typeface="Microsoft Himalaya"/>
+        <a:font script="Thaa" typeface="MV Boli"/>
+        <a:font script="Deva" typeface="Mangal"/>
+        <a:font script="Telu" typeface="Gautami"/>
+        <a:font script="Taml" typeface="Latha"/>
+        <a:font script="Syrc" typeface="Estrangelo Edessa"/>
+        <a:font script="Orya" typeface="Kalinga"/>
+        <a:font script="Mlym" typeface="Kartika"/>
+        <a:font script="Laoo" typeface="DokChampa"/>
+        <a:font script="Sinh" typeface="Iskoola Pota"/>
+        <a:font script="Mong" typeface="Mongolian Baiti"/>
+        <a:font script="Viet" typeface="Arial"/>
+        <a:font script="Uigh" typeface="Microsoft Uighur"/>
+        <a:font script="Geor" typeface="Sylfaen"/>
+      </a:minorFont>
+    </a:fontScheme>
+    <a:fmtScheme name="Kantoor">
+      <a:fillStyleLst>
+        <a:solidFill>
+          <a:schemeClr val="phClr"/>
+        </a:solidFill>
+        <a:gradFill rotWithShape="1">
+          <a:gsLst>
+            <a:gs pos="0">
+              <a:schemeClr val="phClr">
+                <a:lumMod val="110000"/>
+                <a:satMod val="105000"/>
+                <a:tint val="67000"/>
+              </a:schemeClr>
+            </a:gs>
+            <a:gs pos="50000">
+              <a:schemeClr val="phClr">
+                <a:lumMod val="105000"/>
+                <a:satMod val="103000"/>
+                <a:tint val="73000"/>
+              </a:schemeClr>
+            </a:gs>
+            <a:gs pos="100000">
+              <a:schemeClr val="phClr">
+                <a:lumMod val="105000"/>
+                <a:satMod val="109000"/>
+                <a:tint val="81000"/>
+              </a:schemeClr>
+            </a:gs>
+          </a:gsLst>
+          <a:lin ang="5400000" scaled="0"/>
+        </a:gradFill>
+        <a:gradFill rotWithShape="1">
+          <a:gsLst>
+            <a:gs pos="0">
+              <a:schemeClr val="phClr">
+                <a:satMod val="103000"/>
+                <a:lumMod val="102000"/>
+                <a:tint val="94000"/>
+              </a:schemeClr>
+            </a:gs>
+            <a:gs pos="50000">
+              <a:schemeClr val="phClr">
+                <a:satMod val="110000"/>
+                <a:lumMod val="100000"/>
+                <a:shade val="100000"/>
+              </a:schemeClr>
+            </a:gs>
+            <a:gs pos="100000">
+              <a:schemeClr val="phClr">
+                <a:lumMod val="99000"/>
+                <a:satMod val="120000"/>
+                <a:shade val="78000"/>
+              </a:schemeClr>
+            </a:gs>
+          </a:gsLst>
+          <a:lin ang="5400000" scaled="0"/>
+        </a:gradFill>
+      </a:fillStyleLst>
+      <a:lnStyleLst>
+        <a:ln w="6350" cap="flat" cmpd="sng" algn="ctr">
+          <a:solidFill>
+            <a:schemeClr val="phClr"/>
+          </a:solidFill>
+          <a:prstDash val="solid"/>
+          <a:miter lim="800000"/>
+        </a:ln>
+        <a:ln w="12700" cap="flat" cmpd="sng" algn="ctr">
+          <a:solidFill>
+            <a:schemeClr val="phClr"/>
+          </a:solidFill>
+          <a:prstDash val="solid"/>
+          <a:miter lim="800000"/>
+        </a:ln>
+        <a:ln w="19050" cap="flat" cmpd="sng" algn="ctr">
+          <a:solidFill>
+            <a:schemeClr val="phClr"/>
+          </a:solidFill>
+          <a:prstDash val="solid"/>
+          <a:miter lim="800000"/>
+        </a:ln>
+      </a:lnStyleLst>
+      <a:effectStyleLst>
+        <a:effectStyle>
+          <a:effectLst/>
+        </a:effectStyle>
+        <a:effectStyle>
+          <a:effectLst/>
+        </a:effectStyle>
+        <a:effectStyle>
+          <a:effectLst>
+            <a:outerShdw blurRad="57150" dist="19050" dir="5400000" algn="ctr" rotWithShape="0">
+              <a:srgbClr val="000000">
+                <a:alpha val="63000"/>
+              </a:srgbClr>
+            </a:outerShdw>
+          </a:effectLst>
+        </a:effectStyle>
+      </a:effectStyleLst>
+      <a:bgFillStyleLst>
+        <a:solidFill>
+          <a:schemeClr val="phClr"/>
+        </a:solidFill>
+        <a:solidFill>
+          <a:schemeClr val="phClr">
+            <a:tint val="95000"/>
+            <a:satMod val="170000"/>
+          </a:schemeClr>
+        </a:solidFill>
+        <a:gradFill rotWithShape="1">
+          <a:gsLst>
+            <a:gs pos="0">
+              <a:schemeClr val="phClr">
+                <a:tint val="93000"/>
+                <a:satMod val="150000"/>
+                <a:shade val="98000"/>
+                <a:lumMod val="102000"/>
+              </a:schemeClr>
+            </a:gs>
+            <a:gs pos="50000">
+              <a:schemeClr val="phClr">
+                <a:tint val="98000"/>
+                <a:satMod val="130000"/>
+                <a:shade val="90000"/>
+                <a:lumMod val="103000"/>
+              </a:schemeClr>
+            </a:gs>
+            <a:gs pos="100000">
+              <a:schemeClr val="phClr">
+                <a:shade val="63000"/>
+                <a:satMod val="120000"/>
+              </a:schemeClr>
+            </a:gs>
+          </a:gsLst>
+          <a:lin ang="5400000" scaled="0"/>
+        </a:gradFill>
+      </a:bgFillStyleLst>
+    </a:fmtScheme>
+  </a:themeElements>
+  <a:objectDefaults/>
+  <a:extraClrSchemeLst/>
+  <a:extLst>
+    <a:ext uri="{05A4C25C-085E-4340-85A3-A5531E510DB2}">
+      <thm15:themeFamily xmlns:thm15="http://schemas.microsoft.com/office/thememl/2012/main" name="Office Theme" id="{62F939B6-93AF-4DB8-9C6B-D6C7DFDC589F}" vid="{4A3C46E8-61CC-4603-A589-7422A47A8E4A}"/>
+    </a:ext>
+  </a:extLst>
+</a:theme>
 </file>
</xml_diff>

<commit_message>
Version 3.5.7; Repaired LamPI Gui savind configuration settings
</commit_message>
<xml_diff>
--- a/gh-pages/DeveloperGuide/ArchitectureGuide/architecture.pptx
+++ b/gh-pages/DeveloperGuide/ArchitectureGuide/architecture.pptx
@@ -5,12 +5,13 @@
     <p:sldMasterId id="2147483648" r:id="rId1"/>
   </p:sldMasterIdLst>
   <p:notesMasterIdLst>
-    <p:notesMasterId r:id="rId5"/>
+    <p:notesMasterId r:id="rId6"/>
   </p:notesMasterIdLst>
   <p:sldIdLst>
     <p:sldId id="256" r:id="rId2"/>
     <p:sldId id="257" r:id="rId3"/>
     <p:sldId id="258" r:id="rId4"/>
+    <p:sldId id="259" r:id="rId5"/>
   </p:sldIdLst>
   <p:sldSz cx="9144000" cy="6858000" type="screen4x3"/>
   <p:notesSz cx="6858000" cy="9144000"/>
@@ -210,7 +211,7 @@
           <a:p>
             <a:fld id="{AF2A1E05-E974-4380-82C7-142D20023EC5}" type="datetimeFigureOut">
               <a:rPr lang="nl-NL" smtClean="0"/>
-              <a:t>29-6-2015</a:t>
+              <a:t>29-8-2015</a:t>
             </a:fld>
             <a:endParaRPr lang="nl-NL"/>
           </a:p>
@@ -562,6 +563,90 @@
 </p:notes>
 </file>
 
+<file path=ppt/notesSlides/notesSlide2.xml><?xml version="1.0" encoding="utf-8"?>
+<p:notes xmlns:a="http://schemas.openxmlformats.org/drawingml/2006/main" xmlns:r="http://schemas.openxmlformats.org/officeDocument/2006/relationships" xmlns:p="http://schemas.openxmlformats.org/presentationml/2006/main">
+  <p:cSld>
+    <p:spTree>
+      <p:nvGrpSpPr>
+        <p:cNvPr id="1" name=""/>
+        <p:cNvGrpSpPr/>
+        <p:nvPr/>
+      </p:nvGrpSpPr>
+      <p:grpSpPr>
+        <a:xfrm>
+          <a:off x="0" y="0"/>
+          <a:ext cx="0" cy="0"/>
+          <a:chOff x="0" y="0"/>
+          <a:chExt cx="0" cy="0"/>
+        </a:xfrm>
+      </p:grpSpPr>
+      <p:sp>
+        <p:nvSpPr>
+          <p:cNvPr id="2" name="Tijdelijke aanduiding voor dia-afbeelding 1"/>
+          <p:cNvSpPr>
+            <a:spLocks noGrp="1" noRot="1" noChangeAspect="1"/>
+          </p:cNvSpPr>
+          <p:nvPr>
+            <p:ph type="sldImg"/>
+          </p:nvPr>
+        </p:nvSpPr>
+        <p:spPr/>
+      </p:sp>
+      <p:sp>
+        <p:nvSpPr>
+          <p:cNvPr id="3" name="Tijdelijke aanduiding voor notities 2"/>
+          <p:cNvSpPr>
+            <a:spLocks noGrp="1"/>
+          </p:cNvSpPr>
+          <p:nvPr>
+            <p:ph type="body" idx="1"/>
+          </p:nvPr>
+        </p:nvSpPr>
+        <p:spPr/>
+        <p:txBody>
+          <a:bodyPr/>
+          <a:lstStyle/>
+          <a:p>
+            <a:endParaRPr lang="nl-NL" dirty="0"/>
+          </a:p>
+        </p:txBody>
+      </p:sp>
+      <p:sp>
+        <p:nvSpPr>
+          <p:cNvPr id="4" name="Tijdelijke aanduiding voor dianummer 3"/>
+          <p:cNvSpPr>
+            <a:spLocks noGrp="1"/>
+          </p:cNvSpPr>
+          <p:nvPr>
+            <p:ph type="sldNum" sz="quarter" idx="10"/>
+          </p:nvPr>
+        </p:nvSpPr>
+        <p:spPr/>
+        <p:txBody>
+          <a:bodyPr/>
+          <a:lstStyle/>
+          <a:p>
+            <a:fld id="{158AD81D-3061-441A-B732-6B9A356D8602}" type="slidenum">
+              <a:rPr lang="nl-NL" smtClean="0"/>
+              <a:t>4</a:t>
+            </a:fld>
+            <a:endParaRPr lang="nl-NL"/>
+          </a:p>
+        </p:txBody>
+      </p:sp>
+    </p:spTree>
+    <p:extLst>
+      <p:ext uri="{BB962C8B-B14F-4D97-AF65-F5344CB8AC3E}">
+        <p14:creationId xmlns:p14="http://schemas.microsoft.com/office/powerpoint/2010/main" val="4035328131"/>
+      </p:ext>
+    </p:extLst>
+  </p:cSld>
+  <p:clrMapOvr>
+    <a:masterClrMapping/>
+  </p:clrMapOvr>
+</p:notes>
+</file>
+
 <file path=ppt/slideLayouts/slideLayout1.xml><?xml version="1.0" encoding="utf-8"?>
 <p:sldLayout xmlns:a="http://schemas.openxmlformats.org/drawingml/2006/main" xmlns:r="http://schemas.openxmlformats.org/officeDocument/2006/relationships" xmlns:p="http://schemas.openxmlformats.org/presentationml/2006/main" type="title" preserve="1">
   <p:cSld name="Titeldia">
@@ -743,7 +828,7 @@
           <a:p>
             <a:fld id="{2E5BAFD1-66B7-4D5A-B614-B7EE7B6EB2D0}" type="datetimeFigureOut">
               <a:rPr lang="en-US" smtClean="0"/>
-              <a:t>6/28/2015</a:t>
+              <a:t>8/29/2015</a:t>
             </a:fld>
             <a:endParaRPr lang="en-US"/>
           </a:p>
@@ -913,7 +998,7 @@
           <a:p>
             <a:fld id="{2E5BAFD1-66B7-4D5A-B614-B7EE7B6EB2D0}" type="datetimeFigureOut">
               <a:rPr lang="en-US" smtClean="0"/>
-              <a:t>6/28/2015</a:t>
+              <a:t>8/29/2015</a:t>
             </a:fld>
             <a:endParaRPr lang="en-US"/>
           </a:p>
@@ -1093,7 +1178,7 @@
           <a:p>
             <a:fld id="{2E5BAFD1-66B7-4D5A-B614-B7EE7B6EB2D0}" type="datetimeFigureOut">
               <a:rPr lang="en-US" smtClean="0"/>
-              <a:t>6/28/2015</a:t>
+              <a:t>8/29/2015</a:t>
             </a:fld>
             <a:endParaRPr lang="en-US"/>
           </a:p>
@@ -1263,7 +1348,7 @@
           <a:p>
             <a:fld id="{2E5BAFD1-66B7-4D5A-B614-B7EE7B6EB2D0}" type="datetimeFigureOut">
               <a:rPr lang="en-US" smtClean="0"/>
-              <a:t>6/28/2015</a:t>
+              <a:t>8/29/2015</a:t>
             </a:fld>
             <a:endParaRPr lang="en-US"/>
           </a:p>
@@ -1509,7 +1594,7 @@
           <a:p>
             <a:fld id="{2E5BAFD1-66B7-4D5A-B614-B7EE7B6EB2D0}" type="datetimeFigureOut">
               <a:rPr lang="en-US" smtClean="0"/>
-              <a:t>6/28/2015</a:t>
+              <a:t>8/29/2015</a:t>
             </a:fld>
             <a:endParaRPr lang="en-US"/>
           </a:p>
@@ -1797,7 +1882,7 @@
           <a:p>
             <a:fld id="{2E5BAFD1-66B7-4D5A-B614-B7EE7B6EB2D0}" type="datetimeFigureOut">
               <a:rPr lang="en-US" smtClean="0"/>
-              <a:t>6/28/2015</a:t>
+              <a:t>8/29/2015</a:t>
             </a:fld>
             <a:endParaRPr lang="en-US"/>
           </a:p>
@@ -2219,7 +2304,7 @@
           <a:p>
             <a:fld id="{2E5BAFD1-66B7-4D5A-B614-B7EE7B6EB2D0}" type="datetimeFigureOut">
               <a:rPr lang="en-US" smtClean="0"/>
-              <a:t>6/28/2015</a:t>
+              <a:t>8/29/2015</a:t>
             </a:fld>
             <a:endParaRPr lang="en-US"/>
           </a:p>
@@ -2337,7 +2422,7 @@
           <a:p>
             <a:fld id="{2E5BAFD1-66B7-4D5A-B614-B7EE7B6EB2D0}" type="datetimeFigureOut">
               <a:rPr lang="en-US" smtClean="0"/>
-              <a:t>6/28/2015</a:t>
+              <a:t>8/29/2015</a:t>
             </a:fld>
             <a:endParaRPr lang="en-US"/>
           </a:p>
@@ -2432,7 +2517,7 @@
           <a:p>
             <a:fld id="{2E5BAFD1-66B7-4D5A-B614-B7EE7B6EB2D0}" type="datetimeFigureOut">
               <a:rPr lang="en-US" smtClean="0"/>
-              <a:t>6/28/2015</a:t>
+              <a:t>8/29/2015</a:t>
             </a:fld>
             <a:endParaRPr lang="en-US"/>
           </a:p>
@@ -2709,7 +2794,7 @@
           <a:p>
             <a:fld id="{2E5BAFD1-66B7-4D5A-B614-B7EE7B6EB2D0}" type="datetimeFigureOut">
               <a:rPr lang="en-US" smtClean="0"/>
-              <a:t>6/28/2015</a:t>
+              <a:t>8/29/2015</a:t>
             </a:fld>
             <a:endParaRPr lang="en-US"/>
           </a:p>
@@ -2962,7 +3047,7 @@
           <a:p>
             <a:fld id="{2E5BAFD1-66B7-4D5A-B614-B7EE7B6EB2D0}" type="datetimeFigureOut">
               <a:rPr lang="en-US" smtClean="0"/>
-              <a:t>6/28/2015</a:t>
+              <a:t>8/29/2015</a:t>
             </a:fld>
             <a:endParaRPr lang="en-US"/>
           </a:p>
@@ -3175,7 +3260,7 @@
           <a:p>
             <a:fld id="{2E5BAFD1-66B7-4D5A-B614-B7EE7B6EB2D0}" type="datetimeFigureOut">
               <a:rPr lang="en-US" smtClean="0"/>
-              <a:t>6/28/2015</a:t>
+              <a:t>8/29/2015</a:t>
             </a:fld>
             <a:endParaRPr lang="en-US"/>
           </a:p>
@@ -6914,6 +6999,1858 @@
     <p:extLst>
       <p:ext uri="{BB962C8B-B14F-4D97-AF65-F5344CB8AC3E}">
         <p14:creationId xmlns:p14="http://schemas.microsoft.com/office/powerpoint/2010/main" val="224036832"/>
+      </p:ext>
+    </p:extLst>
+  </p:cSld>
+  <p:clrMapOvr>
+    <a:masterClrMapping/>
+  </p:clrMapOvr>
+  <p:timing>
+    <p:tnLst>
+      <p:par>
+        <p:cTn id="1" dur="indefinite" restart="never" nodeType="tmRoot"/>
+      </p:par>
+    </p:tnLst>
+  </p:timing>
+</p:sld>
+</file>
+
+<file path=ppt/slides/slide4.xml><?xml version="1.0" encoding="utf-8"?>
+<p:sld xmlns:a="http://schemas.openxmlformats.org/drawingml/2006/main" xmlns:r="http://schemas.openxmlformats.org/officeDocument/2006/relationships" xmlns:p="http://schemas.openxmlformats.org/presentationml/2006/main">
+  <p:cSld>
+    <p:spTree>
+      <p:nvGrpSpPr>
+        <p:cNvPr id="1" name=""/>
+        <p:cNvGrpSpPr/>
+        <p:nvPr/>
+      </p:nvGrpSpPr>
+      <p:grpSpPr>
+        <a:xfrm>
+          <a:off x="0" y="0"/>
+          <a:ext cx="0" cy="0"/>
+          <a:chOff x="0" y="0"/>
+          <a:chExt cx="0" cy="0"/>
+        </a:xfrm>
+      </p:grpSpPr>
+      <p:sp>
+        <p:nvSpPr>
+          <p:cNvPr id="63" name="Stroomdiagram: Vooraf gedefinieerd proces 62"/>
+          <p:cNvSpPr/>
+          <p:nvPr/>
+        </p:nvSpPr>
+        <p:spPr>
+          <a:xfrm>
+            <a:off x="3079865" y="4808698"/>
+            <a:ext cx="1718838" cy="611855"/>
+          </a:xfrm>
+          <a:prstGeom prst="flowChartPredefinedProcess">
+            <a:avLst/>
+          </a:prstGeom>
+        </p:spPr>
+        <p:style>
+          <a:lnRef idx="2">
+            <a:schemeClr val="accent1">
+              <a:shade val="50000"/>
+            </a:schemeClr>
+          </a:lnRef>
+          <a:fillRef idx="1">
+            <a:schemeClr val="accent1"/>
+          </a:fillRef>
+          <a:effectRef idx="0">
+            <a:schemeClr val="accent1"/>
+          </a:effectRef>
+          <a:fontRef idx="minor">
+            <a:schemeClr val="lt1"/>
+          </a:fontRef>
+        </p:style>
+        <p:txBody>
+          <a:bodyPr rtlCol="0" anchor="ctr"/>
+          <a:lstStyle/>
+          <a:p>
+            <a:pPr algn="ctr"/>
+            <a:r>
+              <a:rPr lang="nl-NL" dirty="0" smtClean="0"/>
+              <a:t>433MHz </a:t>
+            </a:r>
+            <a:r>
+              <a:rPr lang="nl-NL" dirty="0" err="1" smtClean="0"/>
+              <a:t>transceiver</a:t>
+            </a:r>
+            <a:endParaRPr lang="en-US" dirty="0"/>
+          </a:p>
+        </p:txBody>
+      </p:sp>
+      <p:sp>
+        <p:nvSpPr>
+          <p:cNvPr id="62" name="Stroomdiagram: Vooraf gedefinieerd proces 61"/>
+          <p:cNvSpPr/>
+          <p:nvPr/>
+        </p:nvSpPr>
+        <p:spPr>
+          <a:xfrm>
+            <a:off x="3085156" y="3733068"/>
+            <a:ext cx="1420089" cy="683748"/>
+          </a:xfrm>
+          <a:prstGeom prst="flowChartPredefinedProcess">
+            <a:avLst/>
+          </a:prstGeom>
+        </p:spPr>
+        <p:style>
+          <a:lnRef idx="2">
+            <a:schemeClr val="accent1">
+              <a:shade val="50000"/>
+            </a:schemeClr>
+          </a:lnRef>
+          <a:fillRef idx="1">
+            <a:schemeClr val="accent1"/>
+          </a:fillRef>
+          <a:effectRef idx="0">
+            <a:schemeClr val="accent1"/>
+          </a:effectRef>
+          <a:fontRef idx="minor">
+            <a:schemeClr val="lt1"/>
+          </a:fontRef>
+        </p:style>
+        <p:txBody>
+          <a:bodyPr rtlCol="0" anchor="ctr"/>
+          <a:lstStyle/>
+          <a:p>
+            <a:pPr algn="ctr"/>
+            <a:r>
+              <a:rPr lang="nl-NL" dirty="0" err="1" smtClean="0"/>
+              <a:t>Wired</a:t>
+            </a:r>
+            <a:endParaRPr lang="nl-NL" dirty="0" smtClean="0"/>
+          </a:p>
+        </p:txBody>
+      </p:sp>
+      <p:sp>
+        <p:nvSpPr>
+          <p:cNvPr id="60" name="Stroomdiagram: Vooraf gedefinieerd proces 59"/>
+          <p:cNvSpPr/>
+          <p:nvPr/>
+        </p:nvSpPr>
+        <p:spPr>
+          <a:xfrm>
+            <a:off x="3258837" y="3919835"/>
+            <a:ext cx="1541796" cy="738348"/>
+          </a:xfrm>
+          <a:prstGeom prst="flowChartPredefinedProcess">
+            <a:avLst/>
+          </a:prstGeom>
+        </p:spPr>
+        <p:style>
+          <a:lnRef idx="2">
+            <a:schemeClr val="accent1">
+              <a:shade val="50000"/>
+            </a:schemeClr>
+          </a:lnRef>
+          <a:fillRef idx="1">
+            <a:schemeClr val="accent1"/>
+          </a:fillRef>
+          <a:effectRef idx="0">
+            <a:schemeClr val="accent1"/>
+          </a:effectRef>
+          <a:fontRef idx="minor">
+            <a:schemeClr val="lt1"/>
+          </a:fontRef>
+        </p:style>
+        <p:txBody>
+          <a:bodyPr rtlCol="0" anchor="ctr"/>
+          <a:lstStyle/>
+          <a:p>
+            <a:pPr algn="ctr"/>
+            <a:r>
+              <a:rPr lang="nl-NL" dirty="0" err="1" smtClean="0"/>
+              <a:t>Wired</a:t>
+            </a:r>
+            <a:endParaRPr lang="nl-NL" dirty="0" smtClean="0"/>
+          </a:p>
+          <a:p>
+            <a:pPr algn="ctr"/>
+            <a:r>
+              <a:rPr lang="nl-NL" dirty="0" smtClean="0"/>
+              <a:t>Sensors</a:t>
+            </a:r>
+            <a:endParaRPr lang="en-US" dirty="0"/>
+          </a:p>
+        </p:txBody>
+      </p:sp>
+      <p:sp>
+        <p:nvSpPr>
+          <p:cNvPr id="111" name="Afgeronde rechthoek 110"/>
+          <p:cNvSpPr/>
+          <p:nvPr/>
+        </p:nvSpPr>
+        <p:spPr>
+          <a:xfrm>
+            <a:off x="179661" y="2998156"/>
+            <a:ext cx="4685625" cy="592250"/>
+          </a:xfrm>
+          <a:prstGeom prst="roundRect">
+            <a:avLst/>
+          </a:prstGeom>
+          <a:solidFill>
+            <a:schemeClr val="accent5">
+              <a:lumMod val="20000"/>
+              <a:lumOff val="80000"/>
+            </a:schemeClr>
+          </a:solidFill>
+          <a:ln>
+            <a:noFill/>
+          </a:ln>
+        </p:spPr>
+        <p:style>
+          <a:lnRef idx="2">
+            <a:schemeClr val="accent1">
+              <a:shade val="50000"/>
+            </a:schemeClr>
+          </a:lnRef>
+          <a:fillRef idx="1">
+            <a:schemeClr val="accent1"/>
+          </a:fillRef>
+          <a:effectRef idx="0">
+            <a:schemeClr val="accent1"/>
+          </a:effectRef>
+          <a:fontRef idx="minor">
+            <a:schemeClr val="lt1"/>
+          </a:fontRef>
+        </p:style>
+        <p:txBody>
+          <a:bodyPr rtlCol="0" anchor="ctr"/>
+          <a:lstStyle/>
+          <a:p>
+            <a:pPr algn="ctr"/>
+            <a:endParaRPr lang="en-US"/>
+          </a:p>
+        </p:txBody>
+      </p:sp>
+      <p:grpSp>
+        <p:nvGrpSpPr>
+          <p:cNvPr id="6" name="Groep 5"/>
+          <p:cNvGrpSpPr/>
+          <p:nvPr/>
+        </p:nvGrpSpPr>
+        <p:grpSpPr>
+          <a:xfrm>
+            <a:off x="3185921" y="1960154"/>
+            <a:ext cx="803976" cy="908859"/>
+            <a:chOff x="5865390" y="5737239"/>
+            <a:chExt cx="845103" cy="1005166"/>
+          </a:xfrm>
+        </p:grpSpPr>
+        <p:sp>
+          <p:nvSpPr>
+            <p:cNvPr id="42" name="Stroomdiagram: Magnetische schijf 41"/>
+            <p:cNvSpPr/>
+            <p:nvPr/>
+          </p:nvSpPr>
+          <p:spPr>
+            <a:xfrm>
+              <a:off x="5885441" y="5737239"/>
+              <a:ext cx="825052" cy="1005166"/>
+            </a:xfrm>
+            <a:prstGeom prst="flowChartMagneticDisk">
+              <a:avLst/>
+            </a:prstGeom>
+          </p:spPr>
+          <p:style>
+            <a:lnRef idx="2">
+              <a:schemeClr val="accent1">
+                <a:shade val="50000"/>
+              </a:schemeClr>
+            </a:lnRef>
+            <a:fillRef idx="1">
+              <a:schemeClr val="accent1"/>
+            </a:fillRef>
+            <a:effectRef idx="0">
+              <a:schemeClr val="accent1"/>
+            </a:effectRef>
+            <a:fontRef idx="minor">
+              <a:schemeClr val="lt1"/>
+            </a:fontRef>
+          </p:style>
+          <p:txBody>
+            <a:bodyPr rtlCol="0" anchor="ctr"/>
+            <a:lstStyle/>
+            <a:p>
+              <a:pPr algn="ctr"/>
+              <a:endParaRPr lang="en-US"/>
+            </a:p>
+          </p:txBody>
+        </p:sp>
+        <p:sp>
+          <p:nvSpPr>
+            <p:cNvPr id="10" name="Tekstvak 9"/>
+            <p:cNvSpPr txBox="1"/>
+            <p:nvPr/>
+          </p:nvSpPr>
+          <p:spPr>
+            <a:xfrm>
+              <a:off x="5865390" y="6028571"/>
+              <a:ext cx="845103" cy="369332"/>
+            </a:xfrm>
+            <a:prstGeom prst="rect">
+              <a:avLst/>
+            </a:prstGeom>
+            <a:noFill/>
+          </p:spPr>
+          <p:txBody>
+            <a:bodyPr wrap="none" rtlCol="0">
+              <a:spAutoFit/>
+            </a:bodyPr>
+            <a:lstStyle/>
+            <a:p>
+              <a:r>
+                <a:rPr lang="nl-NL" dirty="0" err="1" smtClean="0">
+                  <a:solidFill>
+                    <a:schemeClr val="bg1"/>
+                  </a:solidFill>
+                </a:rPr>
+                <a:t>MySQL</a:t>
+              </a:r>
+              <a:endParaRPr lang="en-US" dirty="0">
+                <a:solidFill>
+                  <a:schemeClr val="bg1"/>
+                </a:solidFill>
+              </a:endParaRPr>
+            </a:p>
+          </p:txBody>
+        </p:sp>
+      </p:grpSp>
+      <p:sp>
+        <p:nvSpPr>
+          <p:cNvPr id="20" name="Rechthoek 19"/>
+          <p:cNvSpPr/>
+          <p:nvPr/>
+        </p:nvSpPr>
+        <p:spPr>
+          <a:xfrm>
+            <a:off x="112757" y="13672"/>
+            <a:ext cx="1364468" cy="622920"/>
+          </a:xfrm>
+          <a:prstGeom prst="rect">
+            <a:avLst/>
+          </a:prstGeom>
+          <a:solidFill>
+            <a:schemeClr val="bg2">
+              <a:lumMod val="90000"/>
+            </a:schemeClr>
+          </a:solidFill>
+        </p:spPr>
+        <p:style>
+          <a:lnRef idx="2">
+            <a:schemeClr val="accent1">
+              <a:shade val="50000"/>
+            </a:schemeClr>
+          </a:lnRef>
+          <a:fillRef idx="1">
+            <a:schemeClr val="accent1"/>
+          </a:fillRef>
+          <a:effectRef idx="0">
+            <a:schemeClr val="accent1"/>
+          </a:effectRef>
+          <a:fontRef idx="minor">
+            <a:schemeClr val="lt1"/>
+          </a:fontRef>
+        </p:style>
+        <p:txBody>
+          <a:bodyPr rtlCol="0" anchor="ctr"/>
+          <a:lstStyle/>
+          <a:p>
+            <a:pPr algn="ctr"/>
+            <a:r>
+              <a:rPr lang="nl-NL" dirty="0" smtClean="0"/>
+              <a:t>GUI </a:t>
+            </a:r>
+            <a:r>
+              <a:rPr lang="nl-NL" dirty="0" err="1" smtClean="0"/>
+              <a:t>Clients</a:t>
+            </a:r>
+            <a:endParaRPr lang="en-US" dirty="0"/>
+          </a:p>
+        </p:txBody>
+      </p:sp>
+      <p:sp>
+        <p:nvSpPr>
+          <p:cNvPr id="21" name="Rechthoek 20"/>
+          <p:cNvSpPr/>
+          <p:nvPr/>
+        </p:nvSpPr>
+        <p:spPr>
+          <a:xfrm>
+            <a:off x="265157" y="166072"/>
+            <a:ext cx="1364468" cy="622920"/>
+          </a:xfrm>
+          <a:prstGeom prst="rect">
+            <a:avLst/>
+          </a:prstGeom>
+          <a:solidFill>
+            <a:schemeClr val="bg2">
+              <a:lumMod val="90000"/>
+            </a:schemeClr>
+          </a:solidFill>
+        </p:spPr>
+        <p:style>
+          <a:lnRef idx="2">
+            <a:schemeClr val="accent1">
+              <a:shade val="50000"/>
+            </a:schemeClr>
+          </a:lnRef>
+          <a:fillRef idx="1">
+            <a:schemeClr val="accent1"/>
+          </a:fillRef>
+          <a:effectRef idx="0">
+            <a:schemeClr val="accent1"/>
+          </a:effectRef>
+          <a:fontRef idx="minor">
+            <a:schemeClr val="lt1"/>
+          </a:fontRef>
+        </p:style>
+        <p:txBody>
+          <a:bodyPr rtlCol="0" anchor="ctr"/>
+          <a:lstStyle/>
+          <a:p>
+            <a:pPr algn="ctr"/>
+            <a:r>
+              <a:rPr lang="nl-NL" dirty="0" smtClean="0"/>
+              <a:t>GUI </a:t>
+            </a:r>
+            <a:r>
+              <a:rPr lang="nl-NL" dirty="0" err="1" smtClean="0"/>
+              <a:t>Clients</a:t>
+            </a:r>
+            <a:endParaRPr lang="en-US" dirty="0"/>
+          </a:p>
+        </p:txBody>
+      </p:sp>
+      <p:sp>
+        <p:nvSpPr>
+          <p:cNvPr id="22" name="Rechthoek 21"/>
+          <p:cNvSpPr/>
+          <p:nvPr/>
+        </p:nvSpPr>
+        <p:spPr>
+          <a:xfrm>
+            <a:off x="417557" y="318472"/>
+            <a:ext cx="1364468" cy="622920"/>
+          </a:xfrm>
+          <a:prstGeom prst="rect">
+            <a:avLst/>
+          </a:prstGeom>
+          <a:solidFill>
+            <a:schemeClr val="bg2">
+              <a:lumMod val="90000"/>
+            </a:schemeClr>
+          </a:solidFill>
+        </p:spPr>
+        <p:style>
+          <a:lnRef idx="2">
+            <a:schemeClr val="accent1">
+              <a:shade val="50000"/>
+            </a:schemeClr>
+          </a:lnRef>
+          <a:fillRef idx="1">
+            <a:schemeClr val="accent1"/>
+          </a:fillRef>
+          <a:effectRef idx="0">
+            <a:schemeClr val="accent1"/>
+          </a:effectRef>
+          <a:fontRef idx="minor">
+            <a:schemeClr val="lt1"/>
+          </a:fontRef>
+        </p:style>
+        <p:txBody>
+          <a:bodyPr rtlCol="0" anchor="ctr"/>
+          <a:lstStyle/>
+          <a:p>
+            <a:pPr algn="ctr"/>
+            <a:r>
+              <a:rPr lang="nl-NL" dirty="0" smtClean="0"/>
+              <a:t>GUI </a:t>
+            </a:r>
+            <a:r>
+              <a:rPr lang="nl-NL" dirty="0" err="1" smtClean="0"/>
+              <a:t>Clients</a:t>
+            </a:r>
+            <a:endParaRPr lang="en-US" dirty="0"/>
+          </a:p>
+        </p:txBody>
+      </p:sp>
+      <p:sp>
+        <p:nvSpPr>
+          <p:cNvPr id="23" name="Rechthoek 22"/>
+          <p:cNvSpPr/>
+          <p:nvPr/>
+        </p:nvSpPr>
+        <p:spPr>
+          <a:xfrm>
+            <a:off x="569957" y="470872"/>
+            <a:ext cx="1364468" cy="622920"/>
+          </a:xfrm>
+          <a:prstGeom prst="rect">
+            <a:avLst/>
+          </a:prstGeom>
+          <a:solidFill>
+            <a:schemeClr val="bg1">
+              <a:lumMod val="95000"/>
+            </a:schemeClr>
+          </a:solidFill>
+          <a:ln>
+            <a:solidFill>
+              <a:schemeClr val="tx2">
+                <a:lumMod val="75000"/>
+              </a:schemeClr>
+            </a:solidFill>
+          </a:ln>
+        </p:spPr>
+        <p:style>
+          <a:lnRef idx="2">
+            <a:schemeClr val="accent1">
+              <a:shade val="50000"/>
+            </a:schemeClr>
+          </a:lnRef>
+          <a:fillRef idx="1">
+            <a:schemeClr val="accent1"/>
+          </a:fillRef>
+          <a:effectRef idx="0">
+            <a:schemeClr val="accent1"/>
+          </a:effectRef>
+          <a:fontRef idx="minor">
+            <a:schemeClr val="lt1"/>
+          </a:fontRef>
+        </p:style>
+        <p:txBody>
+          <a:bodyPr rtlCol="0" anchor="ctr"/>
+          <a:lstStyle/>
+          <a:p>
+            <a:pPr algn="ctr"/>
+            <a:r>
+              <a:rPr lang="nl-NL" dirty="0" smtClean="0">
+                <a:solidFill>
+                  <a:schemeClr val="tx2">
+                    <a:lumMod val="75000"/>
+                  </a:schemeClr>
+                </a:solidFill>
+              </a:rPr>
+              <a:t>GUI </a:t>
+            </a:r>
+            <a:r>
+              <a:rPr lang="nl-NL" dirty="0" err="1" smtClean="0">
+                <a:solidFill>
+                  <a:schemeClr val="tx2">
+                    <a:lumMod val="75000"/>
+                  </a:schemeClr>
+                </a:solidFill>
+              </a:rPr>
+              <a:t>Clients</a:t>
+            </a:r>
+            <a:endParaRPr lang="en-US" dirty="0">
+              <a:solidFill>
+                <a:schemeClr val="tx2">
+                  <a:lumMod val="75000"/>
+                </a:schemeClr>
+              </a:solidFill>
+            </a:endParaRPr>
+          </a:p>
+        </p:txBody>
+      </p:sp>
+      <p:grpSp>
+        <p:nvGrpSpPr>
+          <p:cNvPr id="2" name="Groep 1"/>
+          <p:cNvGrpSpPr/>
+          <p:nvPr/>
+        </p:nvGrpSpPr>
+        <p:grpSpPr>
+          <a:xfrm>
+            <a:off x="4082598" y="1635667"/>
+            <a:ext cx="800826" cy="980061"/>
+            <a:chOff x="6726468" y="2592955"/>
+            <a:chExt cx="919336" cy="1236111"/>
+          </a:xfrm>
+        </p:grpSpPr>
+        <p:sp>
+          <p:nvSpPr>
+            <p:cNvPr id="43" name="Stroomdiagram: Magnetische schijf 42"/>
+            <p:cNvSpPr/>
+            <p:nvPr/>
+          </p:nvSpPr>
+          <p:spPr>
+            <a:xfrm>
+              <a:off x="6726468" y="2592955"/>
+              <a:ext cx="919336" cy="1236111"/>
+            </a:xfrm>
+            <a:prstGeom prst="flowChartMagneticDisk">
+              <a:avLst/>
+            </a:prstGeom>
+          </p:spPr>
+          <p:style>
+            <a:lnRef idx="2">
+              <a:schemeClr val="accent1">
+                <a:shade val="50000"/>
+              </a:schemeClr>
+            </a:lnRef>
+            <a:fillRef idx="1">
+              <a:schemeClr val="accent1"/>
+            </a:fillRef>
+            <a:effectRef idx="0">
+              <a:schemeClr val="accent1"/>
+            </a:effectRef>
+            <a:fontRef idx="minor">
+              <a:schemeClr val="lt1"/>
+            </a:fontRef>
+          </p:style>
+          <p:txBody>
+            <a:bodyPr rtlCol="0" anchor="ctr"/>
+            <a:lstStyle/>
+            <a:p>
+              <a:pPr algn="ctr"/>
+              <a:endParaRPr lang="en-US"/>
+            </a:p>
+          </p:txBody>
+        </p:sp>
+        <p:sp>
+          <p:nvSpPr>
+            <p:cNvPr id="45" name="Tekstvak 44"/>
+            <p:cNvSpPr txBox="1"/>
+            <p:nvPr/>
+          </p:nvSpPr>
+          <p:spPr>
+            <a:xfrm>
+              <a:off x="6806056" y="3031404"/>
+              <a:ext cx="835742" cy="646331"/>
+            </a:xfrm>
+            <a:prstGeom prst="rect">
+              <a:avLst/>
+            </a:prstGeom>
+            <a:noFill/>
+          </p:spPr>
+          <p:txBody>
+            <a:bodyPr wrap="none" rtlCol="0">
+              <a:spAutoFit/>
+            </a:bodyPr>
+            <a:lstStyle/>
+            <a:p>
+              <a:r>
+                <a:rPr lang="nl-NL" dirty="0" err="1" smtClean="0">
+                  <a:solidFill>
+                    <a:schemeClr val="bg1"/>
+                  </a:solidFill>
+                </a:rPr>
+                <a:t>Config</a:t>
+              </a:r>
+              <a:r>
+                <a:rPr lang="nl-NL" dirty="0" smtClean="0">
+                  <a:solidFill>
+                    <a:schemeClr val="bg1"/>
+                  </a:solidFill>
+                </a:rPr>
+                <a:t> </a:t>
+              </a:r>
+            </a:p>
+            <a:p>
+              <a:r>
+                <a:rPr lang="nl-NL" dirty="0" smtClean="0">
+                  <a:solidFill>
+                    <a:schemeClr val="bg1"/>
+                  </a:solidFill>
+                </a:rPr>
+                <a:t>file</a:t>
+              </a:r>
+              <a:endParaRPr lang="en-US" dirty="0">
+                <a:solidFill>
+                  <a:schemeClr val="bg1"/>
+                </a:solidFill>
+              </a:endParaRPr>
+            </a:p>
+          </p:txBody>
+        </p:sp>
+      </p:grpSp>
+      <p:sp>
+        <p:nvSpPr>
+          <p:cNvPr id="51" name="Stroomdiagram: Alternatief proces 50"/>
+          <p:cNvSpPr/>
+          <p:nvPr/>
+        </p:nvSpPr>
+        <p:spPr>
+          <a:xfrm>
+            <a:off x="306191" y="1974149"/>
+            <a:ext cx="1694419" cy="731117"/>
+          </a:xfrm>
+          <a:prstGeom prst="flowChartAlternateProcess">
+            <a:avLst/>
+          </a:prstGeom>
+          <a:solidFill>
+            <a:schemeClr val="accent6">
+              <a:lumMod val="60000"/>
+              <a:lumOff val="40000"/>
+            </a:schemeClr>
+          </a:solidFill>
+        </p:spPr>
+        <p:style>
+          <a:lnRef idx="2">
+            <a:schemeClr val="accent1">
+              <a:shade val="50000"/>
+            </a:schemeClr>
+          </a:lnRef>
+          <a:fillRef idx="1">
+            <a:schemeClr val="accent1"/>
+          </a:fillRef>
+          <a:effectRef idx="0">
+            <a:schemeClr val="accent1"/>
+          </a:effectRef>
+          <a:fontRef idx="minor">
+            <a:schemeClr val="lt1"/>
+          </a:fontRef>
+        </p:style>
+        <p:txBody>
+          <a:bodyPr rtlCol="0" anchor="ctr"/>
+          <a:lstStyle/>
+          <a:p>
+            <a:pPr algn="ctr"/>
+            <a:r>
+              <a:rPr lang="nl-NL" dirty="0" smtClean="0"/>
+              <a:t>LamPI-node.js</a:t>
+            </a:r>
+          </a:p>
+          <a:p>
+            <a:pPr algn="ctr"/>
+            <a:r>
+              <a:rPr lang="nl-NL" dirty="0" smtClean="0"/>
+              <a:t>(master)</a:t>
+            </a:r>
+            <a:endParaRPr lang="en-US" dirty="0"/>
+          </a:p>
+        </p:txBody>
+      </p:sp>
+      <p:cxnSp>
+        <p:nvCxnSpPr>
+          <p:cNvPr id="74" name="Rechte verbindingslijn met pijl 73"/>
+          <p:cNvCxnSpPr/>
+          <p:nvPr/>
+        </p:nvCxnSpPr>
+        <p:spPr>
+          <a:xfrm flipH="1">
+            <a:off x="156672" y="1531355"/>
+            <a:ext cx="2846304" cy="18634"/>
+          </a:xfrm>
+          <a:prstGeom prst="straightConnector1">
+            <a:avLst/>
+          </a:prstGeom>
+          <a:ln w="57150">
+            <a:headEnd type="triangle"/>
+            <a:tailEnd type="triangle"/>
+          </a:ln>
+        </p:spPr>
+        <p:style>
+          <a:lnRef idx="1">
+            <a:schemeClr val="accent1"/>
+          </a:lnRef>
+          <a:fillRef idx="0">
+            <a:schemeClr val="accent1"/>
+          </a:fillRef>
+          <a:effectRef idx="0">
+            <a:schemeClr val="accent1"/>
+          </a:effectRef>
+          <a:fontRef idx="minor">
+            <a:schemeClr val="tx1"/>
+          </a:fontRef>
+        </p:style>
+      </p:cxnSp>
+      <p:sp>
+        <p:nvSpPr>
+          <p:cNvPr id="107" name="Tekstvak 106"/>
+          <p:cNvSpPr txBox="1"/>
+          <p:nvPr/>
+        </p:nvSpPr>
+        <p:spPr>
+          <a:xfrm>
+            <a:off x="1008667" y="2928958"/>
+            <a:ext cx="1874680" cy="369332"/>
+          </a:xfrm>
+          <a:prstGeom prst="rect">
+            <a:avLst/>
+          </a:prstGeom>
+          <a:noFill/>
+        </p:spPr>
+        <p:txBody>
+          <a:bodyPr wrap="none" rtlCol="0">
+            <a:spAutoFit/>
+          </a:bodyPr>
+          <a:lstStyle/>
+          <a:p>
+            <a:r>
+              <a:rPr lang="nl-NL" dirty="0" smtClean="0"/>
+              <a:t>IP </a:t>
+            </a:r>
+            <a:r>
+              <a:rPr lang="nl-NL" dirty="0" err="1" smtClean="0"/>
+              <a:t>communication</a:t>
+            </a:r>
+            <a:endParaRPr lang="en-US" dirty="0"/>
+          </a:p>
+        </p:txBody>
+      </p:sp>
+      <p:sp>
+        <p:nvSpPr>
+          <p:cNvPr id="117" name="Tekstvak 116"/>
+          <p:cNvSpPr txBox="1"/>
+          <p:nvPr/>
+        </p:nvSpPr>
+        <p:spPr>
+          <a:xfrm>
+            <a:off x="1242050" y="1095122"/>
+            <a:ext cx="1270861" cy="369332"/>
+          </a:xfrm>
+          <a:prstGeom prst="rect">
+            <a:avLst/>
+          </a:prstGeom>
+          <a:noFill/>
+        </p:spPr>
+        <p:txBody>
+          <a:bodyPr wrap="none" rtlCol="0">
+            <a:spAutoFit/>
+          </a:bodyPr>
+          <a:lstStyle/>
+          <a:p>
+            <a:r>
+              <a:rPr lang="nl-NL" dirty="0" err="1" smtClean="0"/>
+              <a:t>websockets</a:t>
+            </a:r>
+            <a:endParaRPr lang="en-US" dirty="0"/>
+          </a:p>
+        </p:txBody>
+      </p:sp>
+      <p:cxnSp>
+        <p:nvCxnSpPr>
+          <p:cNvPr id="64" name="Rechte verbindingslijn met pijl 63"/>
+          <p:cNvCxnSpPr>
+            <a:endCxn id="111" idx="1"/>
+          </p:cNvCxnSpPr>
+          <p:nvPr/>
+        </p:nvCxnSpPr>
+        <p:spPr>
+          <a:xfrm flipH="1" flipV="1">
+            <a:off x="179661" y="3294281"/>
+            <a:ext cx="4613616" cy="10070"/>
+          </a:xfrm>
+          <a:prstGeom prst="straightConnector1">
+            <a:avLst/>
+          </a:prstGeom>
+          <a:ln w="57150">
+            <a:headEnd type="triangle"/>
+            <a:tailEnd type="triangle"/>
+          </a:ln>
+        </p:spPr>
+        <p:style>
+          <a:lnRef idx="1">
+            <a:schemeClr val="accent1"/>
+          </a:lnRef>
+          <a:fillRef idx="0">
+            <a:schemeClr val="accent1"/>
+          </a:fillRef>
+          <a:effectRef idx="0">
+            <a:schemeClr val="accent1"/>
+          </a:effectRef>
+          <a:fontRef idx="minor">
+            <a:schemeClr val="tx1"/>
+          </a:fontRef>
+        </p:style>
+      </p:cxnSp>
+      <p:cxnSp>
+        <p:nvCxnSpPr>
+          <p:cNvPr id="68" name="Rechte verbindingslijn met pijl 67"/>
+          <p:cNvCxnSpPr/>
+          <p:nvPr/>
+        </p:nvCxnSpPr>
+        <p:spPr>
+          <a:xfrm flipV="1">
+            <a:off x="683568" y="3341682"/>
+            <a:ext cx="5253" cy="781822"/>
+          </a:xfrm>
+          <a:prstGeom prst="straightConnector1">
+            <a:avLst/>
+          </a:prstGeom>
+          <a:ln w="15875">
+            <a:headEnd type="triangle"/>
+            <a:tailEnd type="triangle"/>
+          </a:ln>
+        </p:spPr>
+        <p:style>
+          <a:lnRef idx="1">
+            <a:schemeClr val="accent1"/>
+          </a:lnRef>
+          <a:fillRef idx="0">
+            <a:schemeClr val="accent1"/>
+          </a:fillRef>
+          <a:effectRef idx="0">
+            <a:schemeClr val="accent1"/>
+          </a:effectRef>
+          <a:fontRef idx="minor">
+            <a:schemeClr val="tx1"/>
+          </a:fontRef>
+        </p:style>
+      </p:cxnSp>
+      <p:sp>
+        <p:nvSpPr>
+          <p:cNvPr id="36" name="Stroomdiagram: Alternatief proces 35"/>
+          <p:cNvSpPr/>
+          <p:nvPr/>
+        </p:nvSpPr>
+        <p:spPr>
+          <a:xfrm>
+            <a:off x="332162" y="4123504"/>
+            <a:ext cx="1694419" cy="659832"/>
+          </a:xfrm>
+          <a:prstGeom prst="flowChartAlternateProcess">
+            <a:avLst/>
+          </a:prstGeom>
+          <a:solidFill>
+            <a:schemeClr val="accent6">
+              <a:lumMod val="60000"/>
+              <a:lumOff val="40000"/>
+            </a:schemeClr>
+          </a:solidFill>
+        </p:spPr>
+        <p:style>
+          <a:lnRef idx="2">
+            <a:schemeClr val="accent1">
+              <a:shade val="50000"/>
+            </a:schemeClr>
+          </a:lnRef>
+          <a:fillRef idx="1">
+            <a:schemeClr val="accent1"/>
+          </a:fillRef>
+          <a:effectRef idx="0">
+            <a:schemeClr val="accent1"/>
+          </a:effectRef>
+          <a:fontRef idx="minor">
+            <a:schemeClr val="lt1"/>
+          </a:fontRef>
+        </p:style>
+        <p:txBody>
+          <a:bodyPr rtlCol="0" anchor="ctr"/>
+          <a:lstStyle/>
+          <a:p>
+            <a:pPr algn="ctr"/>
+            <a:r>
+              <a:rPr lang="nl-NL" dirty="0" err="1" smtClean="0"/>
+              <a:t>Raspberry</a:t>
+            </a:r>
+            <a:endParaRPr lang="nl-NL" dirty="0" smtClean="0"/>
+          </a:p>
+          <a:p>
+            <a:pPr algn="ctr"/>
+            <a:r>
+              <a:rPr lang="nl-NL" dirty="0" smtClean="0"/>
+              <a:t>(</a:t>
+            </a:r>
+            <a:r>
+              <a:rPr lang="nl-NL" dirty="0" err="1" smtClean="0"/>
+              <a:t>slave</a:t>
+            </a:r>
+            <a:r>
+              <a:rPr lang="nl-NL" dirty="0" smtClean="0"/>
+              <a:t>)</a:t>
+            </a:r>
+            <a:endParaRPr lang="en-US" dirty="0"/>
+          </a:p>
+        </p:txBody>
+      </p:sp>
+      <p:cxnSp>
+        <p:nvCxnSpPr>
+          <p:cNvPr id="11" name="Rechte verbindingslijn met pijl 10"/>
+          <p:cNvCxnSpPr/>
+          <p:nvPr/>
+        </p:nvCxnSpPr>
+        <p:spPr>
+          <a:xfrm>
+            <a:off x="2121625" y="4289009"/>
+            <a:ext cx="641593" cy="0"/>
+          </a:xfrm>
+          <a:prstGeom prst="straightConnector1">
+            <a:avLst/>
+          </a:prstGeom>
+          <a:ln>
+            <a:tailEnd type="triangle"/>
+          </a:ln>
+        </p:spPr>
+        <p:style>
+          <a:lnRef idx="3">
+            <a:schemeClr val="accent1"/>
+          </a:lnRef>
+          <a:fillRef idx="0">
+            <a:schemeClr val="accent1"/>
+          </a:fillRef>
+          <a:effectRef idx="2">
+            <a:schemeClr val="accent1"/>
+          </a:effectRef>
+          <a:fontRef idx="minor">
+            <a:schemeClr val="tx1"/>
+          </a:fontRef>
+        </p:style>
+      </p:cxnSp>
+      <p:sp>
+        <p:nvSpPr>
+          <p:cNvPr id="44" name="Stroomdiagram: Alternatief proces 43"/>
+          <p:cNvSpPr/>
+          <p:nvPr/>
+        </p:nvSpPr>
+        <p:spPr>
+          <a:xfrm>
+            <a:off x="541653" y="5303481"/>
+            <a:ext cx="1694419" cy="663253"/>
+          </a:xfrm>
+          <a:prstGeom prst="flowChartAlternateProcess">
+            <a:avLst/>
+          </a:prstGeom>
+          <a:solidFill>
+            <a:schemeClr val="accent6">
+              <a:lumMod val="60000"/>
+              <a:lumOff val="40000"/>
+            </a:schemeClr>
+          </a:solidFill>
+        </p:spPr>
+        <p:style>
+          <a:lnRef idx="2">
+            <a:schemeClr val="accent1">
+              <a:shade val="50000"/>
+            </a:schemeClr>
+          </a:lnRef>
+          <a:fillRef idx="1">
+            <a:schemeClr val="accent1"/>
+          </a:fillRef>
+          <a:effectRef idx="0">
+            <a:schemeClr val="accent1"/>
+          </a:effectRef>
+          <a:fontRef idx="minor">
+            <a:schemeClr val="lt1"/>
+          </a:fontRef>
+        </p:style>
+        <p:txBody>
+          <a:bodyPr rtlCol="0" anchor="ctr"/>
+          <a:lstStyle/>
+          <a:p>
+            <a:pPr algn="ctr"/>
+            <a:r>
+              <a:rPr lang="nl-NL" dirty="0" err="1" smtClean="0"/>
+              <a:t>Raspberry</a:t>
+            </a:r>
+            <a:endParaRPr lang="nl-NL" dirty="0" smtClean="0"/>
+          </a:p>
+          <a:p>
+            <a:pPr algn="ctr"/>
+            <a:r>
+              <a:rPr lang="nl-NL" dirty="0" smtClean="0"/>
+              <a:t>(</a:t>
+            </a:r>
+            <a:r>
+              <a:rPr lang="nl-NL" dirty="0" err="1" smtClean="0"/>
+              <a:t>slave</a:t>
+            </a:r>
+            <a:r>
+              <a:rPr lang="nl-NL" dirty="0" smtClean="0"/>
+              <a:t>)</a:t>
+            </a:r>
+            <a:endParaRPr lang="en-US" dirty="0"/>
+          </a:p>
+        </p:txBody>
+      </p:sp>
+      <p:cxnSp>
+        <p:nvCxnSpPr>
+          <p:cNvPr id="28" name="Rechte verbindingslijn met pijl 27"/>
+          <p:cNvCxnSpPr/>
+          <p:nvPr/>
+        </p:nvCxnSpPr>
+        <p:spPr>
+          <a:xfrm flipV="1">
+            <a:off x="1596890" y="3341683"/>
+            <a:ext cx="24273" cy="1961798"/>
+          </a:xfrm>
+          <a:prstGeom prst="straightConnector1">
+            <a:avLst/>
+          </a:prstGeom>
+          <a:ln w="15875">
+            <a:headEnd type="triangle"/>
+            <a:tailEnd type="triangle"/>
+          </a:ln>
+        </p:spPr>
+        <p:style>
+          <a:lnRef idx="1">
+            <a:schemeClr val="accent1"/>
+          </a:lnRef>
+          <a:fillRef idx="0">
+            <a:schemeClr val="accent1"/>
+          </a:fillRef>
+          <a:effectRef idx="0">
+            <a:schemeClr val="accent1"/>
+          </a:effectRef>
+          <a:fontRef idx="minor">
+            <a:schemeClr val="tx1"/>
+          </a:fontRef>
+        </p:style>
+      </p:cxnSp>
+      <p:cxnSp>
+        <p:nvCxnSpPr>
+          <p:cNvPr id="49" name="Rechte verbindingslijn met pijl 48"/>
+          <p:cNvCxnSpPr/>
+          <p:nvPr/>
+        </p:nvCxnSpPr>
+        <p:spPr>
+          <a:xfrm flipV="1">
+            <a:off x="2247556" y="4393596"/>
+            <a:ext cx="697253" cy="7688"/>
+          </a:xfrm>
+          <a:prstGeom prst="straightConnector1">
+            <a:avLst/>
+          </a:prstGeom>
+          <a:ln>
+            <a:tailEnd type="triangle"/>
+          </a:ln>
+        </p:spPr>
+        <p:style>
+          <a:lnRef idx="3">
+            <a:schemeClr val="accent1"/>
+          </a:lnRef>
+          <a:fillRef idx="0">
+            <a:schemeClr val="accent1"/>
+          </a:fillRef>
+          <a:effectRef idx="2">
+            <a:schemeClr val="accent1"/>
+          </a:effectRef>
+          <a:fontRef idx="minor">
+            <a:schemeClr val="tx1"/>
+          </a:fontRef>
+        </p:style>
+      </p:cxnSp>
+      <p:cxnSp>
+        <p:nvCxnSpPr>
+          <p:cNvPr id="50" name="Rechte verbindingslijn met pijl 49"/>
+          <p:cNvCxnSpPr/>
+          <p:nvPr/>
+        </p:nvCxnSpPr>
+        <p:spPr>
+          <a:xfrm>
+            <a:off x="2148206" y="4496369"/>
+            <a:ext cx="810034" cy="618256"/>
+          </a:xfrm>
+          <a:prstGeom prst="straightConnector1">
+            <a:avLst/>
+          </a:prstGeom>
+          <a:ln>
+            <a:tailEnd type="triangle"/>
+          </a:ln>
+        </p:spPr>
+        <p:style>
+          <a:lnRef idx="3">
+            <a:schemeClr val="accent1"/>
+          </a:lnRef>
+          <a:fillRef idx="0">
+            <a:schemeClr val="accent1"/>
+          </a:fillRef>
+          <a:effectRef idx="2">
+            <a:schemeClr val="accent1"/>
+          </a:effectRef>
+          <a:fontRef idx="minor">
+            <a:schemeClr val="tx1"/>
+          </a:fontRef>
+        </p:style>
+      </p:cxnSp>
+      <p:cxnSp>
+        <p:nvCxnSpPr>
+          <p:cNvPr id="53" name="Rechte verbindingslijn met pijl 52"/>
+          <p:cNvCxnSpPr/>
+          <p:nvPr/>
+        </p:nvCxnSpPr>
+        <p:spPr>
+          <a:xfrm flipV="1">
+            <a:off x="1008667" y="2764754"/>
+            <a:ext cx="0" cy="541481"/>
+          </a:xfrm>
+          <a:prstGeom prst="straightConnector1">
+            <a:avLst/>
+          </a:prstGeom>
+          <a:ln w="15875">
+            <a:headEnd type="triangle"/>
+            <a:tailEnd type="triangle"/>
+          </a:ln>
+        </p:spPr>
+        <p:style>
+          <a:lnRef idx="1">
+            <a:schemeClr val="accent1"/>
+          </a:lnRef>
+          <a:fillRef idx="0">
+            <a:schemeClr val="accent1"/>
+          </a:fillRef>
+          <a:effectRef idx="0">
+            <a:schemeClr val="accent1"/>
+          </a:effectRef>
+          <a:fontRef idx="minor">
+            <a:schemeClr val="tx1"/>
+          </a:fontRef>
+        </p:style>
+      </p:cxnSp>
+      <p:cxnSp>
+        <p:nvCxnSpPr>
+          <p:cNvPr id="61" name="Rechte verbindingslijn met pijl 60"/>
+          <p:cNvCxnSpPr/>
+          <p:nvPr/>
+        </p:nvCxnSpPr>
+        <p:spPr>
+          <a:xfrm flipV="1">
+            <a:off x="1008667" y="1072124"/>
+            <a:ext cx="0" cy="477865"/>
+          </a:xfrm>
+          <a:prstGeom prst="straightConnector1">
+            <a:avLst/>
+          </a:prstGeom>
+          <a:ln w="15875">
+            <a:headEnd type="triangle"/>
+            <a:tailEnd type="triangle"/>
+          </a:ln>
+        </p:spPr>
+        <p:style>
+          <a:lnRef idx="1">
+            <a:schemeClr val="accent1"/>
+          </a:lnRef>
+          <a:fillRef idx="0">
+            <a:schemeClr val="accent1"/>
+          </a:fillRef>
+          <a:effectRef idx="0">
+            <a:schemeClr val="accent1"/>
+          </a:effectRef>
+          <a:fontRef idx="minor">
+            <a:schemeClr val="tx1"/>
+          </a:fontRef>
+        </p:style>
+      </p:cxnSp>
+      <p:cxnSp>
+        <p:nvCxnSpPr>
+          <p:cNvPr id="65" name="Rechte verbindingslijn met pijl 64"/>
+          <p:cNvCxnSpPr/>
+          <p:nvPr/>
+        </p:nvCxnSpPr>
+        <p:spPr>
+          <a:xfrm flipV="1">
+            <a:off x="1331640" y="1566991"/>
+            <a:ext cx="5253" cy="416304"/>
+          </a:xfrm>
+          <a:prstGeom prst="straightConnector1">
+            <a:avLst/>
+          </a:prstGeom>
+          <a:ln w="15875">
+            <a:headEnd type="triangle"/>
+            <a:tailEnd type="triangle"/>
+          </a:ln>
+        </p:spPr>
+        <p:style>
+          <a:lnRef idx="1">
+            <a:schemeClr val="accent1"/>
+          </a:lnRef>
+          <a:fillRef idx="0">
+            <a:schemeClr val="accent1"/>
+          </a:fillRef>
+          <a:effectRef idx="0">
+            <a:schemeClr val="accent1"/>
+          </a:effectRef>
+          <a:fontRef idx="minor">
+            <a:schemeClr val="tx1"/>
+          </a:fontRef>
+        </p:style>
+      </p:cxnSp>
+      <p:sp>
+        <p:nvSpPr>
+          <p:cNvPr id="67" name="Stroomdiagram: Vooraf gedefinieerd proces 66"/>
+          <p:cNvSpPr/>
+          <p:nvPr/>
+        </p:nvSpPr>
+        <p:spPr>
+          <a:xfrm>
+            <a:off x="3048877" y="5635108"/>
+            <a:ext cx="1718838" cy="611855"/>
+          </a:xfrm>
+          <a:prstGeom prst="flowChartPredefinedProcess">
+            <a:avLst/>
+          </a:prstGeom>
+        </p:spPr>
+        <p:style>
+          <a:lnRef idx="2">
+            <a:schemeClr val="accent1">
+              <a:shade val="50000"/>
+            </a:schemeClr>
+          </a:lnRef>
+          <a:fillRef idx="1">
+            <a:schemeClr val="accent1"/>
+          </a:fillRef>
+          <a:effectRef idx="0">
+            <a:schemeClr val="accent1"/>
+          </a:effectRef>
+          <a:fontRef idx="minor">
+            <a:schemeClr val="lt1"/>
+          </a:fontRef>
+        </p:style>
+        <p:txBody>
+          <a:bodyPr rtlCol="0" anchor="ctr"/>
+          <a:lstStyle/>
+          <a:p>
+            <a:pPr algn="ctr"/>
+            <a:r>
+              <a:rPr lang="nl-NL" dirty="0" err="1" smtClean="0"/>
+              <a:t>Arduino</a:t>
+            </a:r>
+            <a:r>
+              <a:rPr lang="nl-NL" dirty="0"/>
+              <a:t> </a:t>
+            </a:r>
+            <a:r>
+              <a:rPr lang="nl-NL" dirty="0" smtClean="0"/>
+              <a:t>Gateway</a:t>
+            </a:r>
+            <a:endParaRPr lang="en-US" dirty="0"/>
+          </a:p>
+        </p:txBody>
+      </p:sp>
+      <p:cxnSp>
+        <p:nvCxnSpPr>
+          <p:cNvPr id="70" name="Rechte verbindingslijn met pijl 69"/>
+          <p:cNvCxnSpPr/>
+          <p:nvPr/>
+        </p:nvCxnSpPr>
+        <p:spPr>
+          <a:xfrm>
+            <a:off x="2324549" y="5692522"/>
+            <a:ext cx="633691" cy="286143"/>
+          </a:xfrm>
+          <a:prstGeom prst="straightConnector1">
+            <a:avLst/>
+          </a:prstGeom>
+          <a:ln>
+            <a:tailEnd type="triangle"/>
+          </a:ln>
+        </p:spPr>
+        <p:style>
+          <a:lnRef idx="3">
+            <a:schemeClr val="accent1"/>
+          </a:lnRef>
+          <a:fillRef idx="0">
+            <a:schemeClr val="accent1"/>
+          </a:fillRef>
+          <a:effectRef idx="2">
+            <a:schemeClr val="accent1"/>
+          </a:effectRef>
+          <a:fontRef idx="minor">
+            <a:schemeClr val="tx1"/>
+          </a:fontRef>
+        </p:style>
+      </p:cxnSp>
+      <p:sp>
+        <p:nvSpPr>
+          <p:cNvPr id="37" name="Tekstvak 36"/>
+          <p:cNvSpPr txBox="1"/>
+          <p:nvPr/>
+        </p:nvSpPr>
+        <p:spPr>
+          <a:xfrm>
+            <a:off x="7816681" y="792092"/>
+            <a:ext cx="1127232" cy="369332"/>
+          </a:xfrm>
+          <a:prstGeom prst="rect">
+            <a:avLst/>
+          </a:prstGeom>
+          <a:noFill/>
+        </p:spPr>
+        <p:txBody>
+          <a:bodyPr wrap="none" rtlCol="0">
+            <a:spAutoFit/>
+          </a:bodyPr>
+          <a:lstStyle/>
+          <a:p>
+            <a:r>
+              <a:rPr lang="nl-NL" dirty="0" err="1" smtClean="0"/>
+              <a:t>LamPI</a:t>
+            </a:r>
+            <a:r>
+              <a:rPr lang="nl-NL" dirty="0" smtClean="0"/>
+              <a:t> Gui</a:t>
+            </a:r>
+            <a:endParaRPr lang="nl-NL" dirty="0"/>
+          </a:p>
+        </p:txBody>
+      </p:sp>
+      <p:sp>
+        <p:nvSpPr>
+          <p:cNvPr id="71" name="Tekstvak 70"/>
+          <p:cNvSpPr txBox="1"/>
+          <p:nvPr/>
+        </p:nvSpPr>
+        <p:spPr>
+          <a:xfrm>
+            <a:off x="7715456" y="2134116"/>
+            <a:ext cx="1287532" cy="369332"/>
+          </a:xfrm>
+          <a:prstGeom prst="rect">
+            <a:avLst/>
+          </a:prstGeom>
+          <a:noFill/>
+        </p:spPr>
+        <p:txBody>
+          <a:bodyPr wrap="none" rtlCol="0">
+            <a:spAutoFit/>
+          </a:bodyPr>
+          <a:lstStyle/>
+          <a:p>
+            <a:r>
+              <a:rPr lang="nl-NL" dirty="0" err="1" smtClean="0"/>
+              <a:t>LamPI</a:t>
+            </a:r>
+            <a:r>
+              <a:rPr lang="nl-NL" dirty="0" smtClean="0"/>
+              <a:t> node</a:t>
+            </a:r>
+            <a:endParaRPr lang="nl-NL" dirty="0"/>
+          </a:p>
+        </p:txBody>
+      </p:sp>
+      <p:sp>
+        <p:nvSpPr>
+          <p:cNvPr id="72" name="Tekstvak 71"/>
+          <p:cNvSpPr txBox="1"/>
+          <p:nvPr/>
+        </p:nvSpPr>
+        <p:spPr>
+          <a:xfrm>
+            <a:off x="7599570" y="5704418"/>
+            <a:ext cx="1561453" cy="369332"/>
+          </a:xfrm>
+          <a:prstGeom prst="rect">
+            <a:avLst/>
+          </a:prstGeom>
+          <a:noFill/>
+        </p:spPr>
+        <p:txBody>
+          <a:bodyPr wrap="none" rtlCol="0">
+            <a:spAutoFit/>
+          </a:bodyPr>
+          <a:lstStyle/>
+          <a:p>
+            <a:r>
+              <a:rPr lang="nl-NL" dirty="0" err="1" smtClean="0"/>
+              <a:t>Arduino</a:t>
+            </a:r>
+            <a:r>
+              <a:rPr lang="nl-NL" dirty="0" smtClean="0"/>
+              <a:t> </a:t>
+            </a:r>
+            <a:r>
+              <a:rPr lang="nl-NL" dirty="0" err="1" smtClean="0"/>
+              <a:t>G’way</a:t>
+            </a:r>
+            <a:endParaRPr lang="nl-NL" dirty="0"/>
+          </a:p>
+        </p:txBody>
+      </p:sp>
+      <p:sp>
+        <p:nvSpPr>
+          <p:cNvPr id="75" name="Tekstvak 74"/>
+          <p:cNvSpPr txBox="1"/>
+          <p:nvPr/>
+        </p:nvSpPr>
+        <p:spPr>
+          <a:xfrm>
+            <a:off x="7812191" y="4003268"/>
+            <a:ext cx="905248" cy="369332"/>
+          </a:xfrm>
+          <a:prstGeom prst="rect">
+            <a:avLst/>
+          </a:prstGeom>
+          <a:noFill/>
+        </p:spPr>
+        <p:txBody>
+          <a:bodyPr wrap="none" rtlCol="0">
+            <a:spAutoFit/>
+          </a:bodyPr>
+          <a:lstStyle/>
+          <a:p>
+            <a:r>
+              <a:rPr lang="nl-NL" dirty="0" smtClean="0"/>
+              <a:t>Sensors</a:t>
+            </a:r>
+            <a:endParaRPr lang="nl-NL" dirty="0"/>
+          </a:p>
+        </p:txBody>
+      </p:sp>
+      <p:sp>
+        <p:nvSpPr>
+          <p:cNvPr id="77" name="Tekstvak 76"/>
+          <p:cNvSpPr txBox="1"/>
+          <p:nvPr/>
+        </p:nvSpPr>
+        <p:spPr>
+          <a:xfrm>
+            <a:off x="7780689" y="4791459"/>
+            <a:ext cx="1346907" cy="646331"/>
+          </a:xfrm>
+          <a:prstGeom prst="rect">
+            <a:avLst/>
+          </a:prstGeom>
+          <a:noFill/>
+        </p:spPr>
+        <p:txBody>
+          <a:bodyPr wrap="none" rtlCol="0">
+            <a:spAutoFit/>
+          </a:bodyPr>
+          <a:lstStyle/>
+          <a:p>
+            <a:r>
+              <a:rPr lang="nl-NL" dirty="0" smtClean="0"/>
+              <a:t>Receivers /</a:t>
+            </a:r>
+          </a:p>
+          <a:p>
+            <a:r>
+              <a:rPr lang="nl-NL" dirty="0" smtClean="0"/>
+              <a:t>Transmitters</a:t>
+            </a:r>
+            <a:endParaRPr lang="nl-NL" dirty="0"/>
+          </a:p>
+        </p:txBody>
+      </p:sp>
+      <p:sp>
+        <p:nvSpPr>
+          <p:cNvPr id="78" name="Tekstvak 77"/>
+          <p:cNvSpPr txBox="1"/>
+          <p:nvPr/>
+        </p:nvSpPr>
+        <p:spPr>
+          <a:xfrm>
+            <a:off x="2204981" y="5793999"/>
+            <a:ext cx="562975" cy="369332"/>
+          </a:xfrm>
+          <a:prstGeom prst="rect">
+            <a:avLst/>
+          </a:prstGeom>
+          <a:noFill/>
+        </p:spPr>
+        <p:txBody>
+          <a:bodyPr wrap="none" rtlCol="0">
+            <a:spAutoFit/>
+          </a:bodyPr>
+          <a:lstStyle/>
+          <a:p>
+            <a:r>
+              <a:rPr lang="nl-NL" dirty="0" smtClean="0"/>
+              <a:t>USB</a:t>
+            </a:r>
+            <a:endParaRPr lang="nl-NL" dirty="0"/>
+          </a:p>
+        </p:txBody>
+      </p:sp>
+      <p:sp>
+        <p:nvSpPr>
+          <p:cNvPr id="79" name="Stroomdiagram: Vooraf gedefinieerd proces 78"/>
+          <p:cNvSpPr/>
+          <p:nvPr/>
+        </p:nvSpPr>
+        <p:spPr>
+          <a:xfrm>
+            <a:off x="5590744" y="5915814"/>
+            <a:ext cx="1718838" cy="611855"/>
+          </a:xfrm>
+          <a:prstGeom prst="flowChartPredefinedProcess">
+            <a:avLst/>
+          </a:prstGeom>
+        </p:spPr>
+        <p:style>
+          <a:lnRef idx="2">
+            <a:schemeClr val="accent1">
+              <a:shade val="50000"/>
+            </a:schemeClr>
+          </a:lnRef>
+          <a:fillRef idx="1">
+            <a:schemeClr val="accent1"/>
+          </a:fillRef>
+          <a:effectRef idx="0">
+            <a:schemeClr val="accent1"/>
+          </a:effectRef>
+          <a:fontRef idx="minor">
+            <a:schemeClr val="lt1"/>
+          </a:fontRef>
+        </p:style>
+        <p:txBody>
+          <a:bodyPr rtlCol="0" anchor="ctr"/>
+          <a:lstStyle/>
+          <a:p>
+            <a:pPr algn="ctr"/>
+            <a:r>
+              <a:rPr lang="nl-NL" dirty="0" smtClean="0"/>
+              <a:t>433MHz </a:t>
+            </a:r>
+            <a:r>
+              <a:rPr lang="nl-NL" dirty="0" err="1" smtClean="0"/>
+              <a:t>transceiver</a:t>
+            </a:r>
+            <a:endParaRPr lang="en-US" dirty="0"/>
+          </a:p>
+        </p:txBody>
+      </p:sp>
+      <p:sp>
+        <p:nvSpPr>
+          <p:cNvPr id="81" name="Stroomdiagram: Vooraf gedefinieerd proces 80"/>
+          <p:cNvSpPr/>
+          <p:nvPr/>
+        </p:nvSpPr>
+        <p:spPr>
+          <a:xfrm>
+            <a:off x="5580520" y="5326493"/>
+            <a:ext cx="1541796" cy="488039"/>
+          </a:xfrm>
+          <a:prstGeom prst="flowChartPredefinedProcess">
+            <a:avLst/>
+          </a:prstGeom>
+        </p:spPr>
+        <p:style>
+          <a:lnRef idx="2">
+            <a:schemeClr val="accent1">
+              <a:shade val="50000"/>
+            </a:schemeClr>
+          </a:lnRef>
+          <a:fillRef idx="1">
+            <a:schemeClr val="accent1"/>
+          </a:fillRef>
+          <a:effectRef idx="0">
+            <a:schemeClr val="accent1"/>
+          </a:effectRef>
+          <a:fontRef idx="minor">
+            <a:schemeClr val="lt1"/>
+          </a:fontRef>
+        </p:style>
+        <p:txBody>
+          <a:bodyPr rtlCol="0" anchor="ctr"/>
+          <a:lstStyle/>
+          <a:p>
+            <a:pPr algn="ctr"/>
+            <a:r>
+              <a:rPr lang="nl-NL" dirty="0" smtClean="0"/>
+              <a:t>Sensors</a:t>
+            </a:r>
+            <a:endParaRPr lang="en-US" dirty="0"/>
+          </a:p>
+        </p:txBody>
+      </p:sp>
+      <p:cxnSp>
+        <p:nvCxnSpPr>
+          <p:cNvPr id="82" name="Rechte verbindingslijn met pijl 81"/>
+          <p:cNvCxnSpPr>
+            <a:endCxn id="81" idx="1"/>
+          </p:cNvCxnSpPr>
+          <p:nvPr/>
+        </p:nvCxnSpPr>
+        <p:spPr>
+          <a:xfrm flipV="1">
+            <a:off x="4909376" y="5570513"/>
+            <a:ext cx="671144" cy="244019"/>
+          </a:xfrm>
+          <a:prstGeom prst="straightConnector1">
+            <a:avLst/>
+          </a:prstGeom>
+          <a:ln>
+            <a:tailEnd type="triangle"/>
+          </a:ln>
+        </p:spPr>
+        <p:style>
+          <a:lnRef idx="3">
+            <a:schemeClr val="accent1"/>
+          </a:lnRef>
+          <a:fillRef idx="0">
+            <a:schemeClr val="accent1"/>
+          </a:fillRef>
+          <a:effectRef idx="2">
+            <a:schemeClr val="accent1"/>
+          </a:effectRef>
+          <a:fontRef idx="minor">
+            <a:schemeClr val="tx1"/>
+          </a:fontRef>
+        </p:style>
+      </p:cxnSp>
+      <p:cxnSp>
+        <p:nvCxnSpPr>
+          <p:cNvPr id="83" name="Rechte verbindingslijn met pijl 82"/>
+          <p:cNvCxnSpPr/>
+          <p:nvPr/>
+        </p:nvCxnSpPr>
+        <p:spPr>
+          <a:xfrm>
+            <a:off x="4909376" y="5978665"/>
+            <a:ext cx="650617" cy="223664"/>
+          </a:xfrm>
+          <a:prstGeom prst="straightConnector1">
+            <a:avLst/>
+          </a:prstGeom>
+          <a:ln>
+            <a:tailEnd type="triangle"/>
+          </a:ln>
+        </p:spPr>
+        <p:style>
+          <a:lnRef idx="3">
+            <a:schemeClr val="accent1"/>
+          </a:lnRef>
+          <a:fillRef idx="0">
+            <a:schemeClr val="accent1"/>
+          </a:fillRef>
+          <a:effectRef idx="2">
+            <a:schemeClr val="accent1"/>
+          </a:effectRef>
+          <a:fontRef idx="minor">
+            <a:schemeClr val="tx1"/>
+          </a:fontRef>
+        </p:style>
+      </p:cxnSp>
+      <p:sp>
+        <p:nvSpPr>
+          <p:cNvPr id="91" name="Tekstvak 90"/>
+          <p:cNvSpPr txBox="1"/>
+          <p:nvPr/>
+        </p:nvSpPr>
+        <p:spPr>
+          <a:xfrm>
+            <a:off x="2346822" y="4428341"/>
+            <a:ext cx="659155" cy="369332"/>
+          </a:xfrm>
+          <a:prstGeom prst="rect">
+            <a:avLst/>
+          </a:prstGeom>
+          <a:noFill/>
+        </p:spPr>
+        <p:txBody>
+          <a:bodyPr wrap="none" rtlCol="0">
+            <a:spAutoFit/>
+          </a:bodyPr>
+          <a:lstStyle/>
+          <a:p>
+            <a:r>
+              <a:rPr lang="nl-NL" dirty="0" smtClean="0"/>
+              <a:t>GPIO</a:t>
+            </a:r>
+            <a:endParaRPr lang="nl-NL" dirty="0"/>
+          </a:p>
+        </p:txBody>
+      </p:sp>
+      <p:cxnSp>
+        <p:nvCxnSpPr>
+          <p:cNvPr id="96" name="Rechte verbindingslijn met pijl 95"/>
+          <p:cNvCxnSpPr/>
+          <p:nvPr/>
+        </p:nvCxnSpPr>
+        <p:spPr>
+          <a:xfrm>
+            <a:off x="2121625" y="2372297"/>
+            <a:ext cx="927252" cy="4344"/>
+          </a:xfrm>
+          <a:prstGeom prst="straightConnector1">
+            <a:avLst/>
+          </a:prstGeom>
+          <a:ln>
+            <a:tailEnd type="triangle"/>
+          </a:ln>
+        </p:spPr>
+        <p:style>
+          <a:lnRef idx="3">
+            <a:schemeClr val="accent1"/>
+          </a:lnRef>
+          <a:fillRef idx="0">
+            <a:schemeClr val="accent1"/>
+          </a:fillRef>
+          <a:effectRef idx="2">
+            <a:schemeClr val="accent1"/>
+          </a:effectRef>
+          <a:fontRef idx="minor">
+            <a:schemeClr val="tx1"/>
+          </a:fontRef>
+        </p:style>
+      </p:cxnSp>
+      <p:cxnSp>
+        <p:nvCxnSpPr>
+          <p:cNvPr id="98" name="Rechte verbindingslijn met pijl 97"/>
+          <p:cNvCxnSpPr/>
+          <p:nvPr/>
+        </p:nvCxnSpPr>
+        <p:spPr>
+          <a:xfrm>
+            <a:off x="2251564" y="2118558"/>
+            <a:ext cx="927252" cy="4344"/>
+          </a:xfrm>
+          <a:prstGeom prst="straightConnector1">
+            <a:avLst/>
+          </a:prstGeom>
+          <a:ln>
+            <a:tailEnd type="triangle"/>
+          </a:ln>
+        </p:spPr>
+        <p:style>
+          <a:lnRef idx="3">
+            <a:schemeClr val="accent1"/>
+          </a:lnRef>
+          <a:fillRef idx="0">
+            <a:schemeClr val="accent1"/>
+          </a:fillRef>
+          <a:effectRef idx="2">
+            <a:schemeClr val="accent1"/>
+          </a:effectRef>
+          <a:fontRef idx="minor">
+            <a:schemeClr val="tx1"/>
+          </a:fontRef>
+        </p:style>
+      </p:cxnSp>
+      <p:sp>
+        <p:nvSpPr>
+          <p:cNvPr id="105" name="Wolkvormige toelichting 104"/>
+          <p:cNvSpPr/>
+          <p:nvPr/>
+        </p:nvSpPr>
+        <p:spPr>
+          <a:xfrm>
+            <a:off x="5163618" y="3789040"/>
+            <a:ext cx="1895900" cy="1071952"/>
+          </a:xfrm>
+          <a:prstGeom prst="cloudCallout">
+            <a:avLst/>
+          </a:prstGeom>
+          <a:solidFill>
+            <a:schemeClr val="accent5">
+              <a:lumMod val="20000"/>
+              <a:lumOff val="80000"/>
+            </a:schemeClr>
+          </a:solidFill>
+        </p:spPr>
+        <p:style>
+          <a:lnRef idx="2">
+            <a:schemeClr val="accent1">
+              <a:shade val="50000"/>
+            </a:schemeClr>
+          </a:lnRef>
+          <a:fillRef idx="1">
+            <a:schemeClr val="accent1"/>
+          </a:fillRef>
+          <a:effectRef idx="0">
+            <a:schemeClr val="accent1"/>
+          </a:effectRef>
+          <a:fontRef idx="minor">
+            <a:schemeClr val="lt1"/>
+          </a:fontRef>
+        </p:style>
+        <p:txBody>
+          <a:bodyPr rtlCol="0" anchor="ctr"/>
+          <a:lstStyle/>
+          <a:p>
+            <a:pPr algn="ctr"/>
+            <a:endParaRPr lang="en-US"/>
+          </a:p>
+        </p:txBody>
+      </p:sp>
+    </p:spTree>
+    <p:extLst>
+      <p:ext uri="{BB962C8B-B14F-4D97-AF65-F5344CB8AC3E}">
+        <p14:creationId xmlns:p14="http://schemas.microsoft.com/office/powerpoint/2010/main" val="1313738533"/>
       </p:ext>
     </p:extLst>
   </p:cSld>

</xml_diff>